<commit_message>
updated presentation & report
</commit_message>
<xml_diff>
--- a/lazywget.pptx
+++ b/lazywget.pptx
@@ -4378,7 +4378,7 @@
               </a:lnSpc>
             </a:pPr>
             <a:r>
-              <a:rPr lang="ro-RO" sz="6000" spc="-1" dirty="0" smtClean="0">
+              <a:rPr lang="ro-RO" sz="6000" spc="-1" dirty="0">
                 <a:solidFill>
                   <a:srgbClr val="000000"/>
                 </a:solidFill>
@@ -4410,7 +4410,7 @@
               </a:lnSpc>
             </a:pPr>
             <a:r>
-              <a:rPr lang="ro-RO" sz="2800" b="0" strike="noStrike" spc="-1" dirty="0" smtClean="0">
+              <a:rPr lang="ro-RO" sz="2800" b="0" strike="noStrike" spc="-1" dirty="0">
                 <a:solidFill>
                   <a:srgbClr val="000000"/>
                 </a:solidFill>
@@ -4431,18 +4431,18 @@
               </a:lnSpc>
             </a:pPr>
             <a:r>
-              <a:rPr lang="ro-RO" sz="2800" spc="-1" dirty="0" smtClean="0">
-                <a:solidFill>
-                  <a:srgbClr val="000000"/>
-                </a:solidFill>
-                <a:uFill>
-                  <a:solidFill>
-                    <a:srgbClr val="FFFFFF"/>
-                  </a:solidFill>
-                </a:uFill>
-                <a:latin typeface="Arial"/>
-              </a:rPr>
-              <a:t>Antonie Belu</a:t>
+              <a:rPr lang="ro-RO" sz="2800" spc="-1" dirty="0">
+                <a:solidFill>
+                  <a:srgbClr val="000000"/>
+                </a:solidFill>
+                <a:uFill>
+                  <a:solidFill>
+                    <a:srgbClr val="FFFFFF"/>
+                  </a:solidFill>
+                </a:uFill>
+                <a:latin typeface="Arial"/>
+              </a:rPr>
+              <a:t>Antonie-Gabriel Belu</a:t>
             </a:r>
             <a:endParaRPr lang="en-US" sz="2800" b="0" strike="noStrike" spc="-1" dirty="0">
               <a:solidFill>
@@ -4499,7 +4499,7 @@
               </a:lnSpc>
             </a:pPr>
             <a:r>
-              <a:rPr lang="en-US" sz="2400" b="0" strike="noStrike" spc="-1">
+              <a:rPr lang="en-US" sz="2400" b="0" strike="noStrike" spc="-1" dirty="0" err="1">
                 <a:solidFill>
                   <a:srgbClr val="000000"/>
                 </a:solidFill>
@@ -4511,9 +4511,39 @@
                 <a:latin typeface="Calibri"/>
                 <a:ea typeface="DejaVu Sans"/>
               </a:rPr>
-              <a:t>Universitatea din Bucuresti</a:t>
-            </a:r>
-            <a:endParaRPr lang="en-US" sz="1800" b="0" strike="noStrike" spc="-1">
+              <a:t>Universitatea</a:t>
+            </a:r>
+            <a:r>
+              <a:rPr lang="en-US" sz="2400" b="0" strike="noStrike" spc="-1" dirty="0">
+                <a:solidFill>
+                  <a:srgbClr val="000000"/>
+                </a:solidFill>
+                <a:uFill>
+                  <a:solidFill>
+                    <a:srgbClr val="FFFFFF"/>
+                  </a:solidFill>
+                </a:uFill>
+                <a:latin typeface="Calibri"/>
+                <a:ea typeface="DejaVu Sans"/>
+              </a:rPr>
+              <a:t> din </a:t>
+            </a:r>
+            <a:r>
+              <a:rPr lang="en-US" sz="2400" b="0" strike="noStrike" spc="-1" dirty="0" err="1">
+                <a:solidFill>
+                  <a:srgbClr val="000000"/>
+                </a:solidFill>
+                <a:uFill>
+                  <a:solidFill>
+                    <a:srgbClr val="FFFFFF"/>
+                  </a:solidFill>
+                </a:uFill>
+                <a:latin typeface="Calibri"/>
+                <a:ea typeface="DejaVu Sans"/>
+              </a:rPr>
+              <a:t>Bucuresti</a:t>
+            </a:r>
+            <a:endParaRPr lang="en-US" sz="1800" b="0" strike="noStrike" spc="-1" dirty="0">
               <a:solidFill>
                 <a:srgbClr val="000000"/>
               </a:solidFill>
@@ -4532,7 +4562,7 @@
               </a:lnSpc>
             </a:pPr>
             <a:r>
-              <a:rPr lang="en-US" sz="2400" b="0" strike="noStrike" spc="-1">
+              <a:rPr lang="en-US" sz="2400" b="0" strike="noStrike" spc="-1" dirty="0" err="1">
                 <a:solidFill>
                   <a:srgbClr val="000000"/>
                 </a:solidFill>
@@ -4544,9 +4574,24 @@
                 <a:latin typeface="Calibri"/>
                 <a:ea typeface="DejaVu Sans"/>
               </a:rPr>
-              <a:t>Departamentul de Informatica</a:t>
-            </a:r>
-            <a:endParaRPr lang="en-US" sz="1800" b="0" strike="noStrike" spc="-1">
+              <a:t>Departamentul</a:t>
+            </a:r>
+            <a:r>
+              <a:rPr lang="en-US" sz="2400" b="0" strike="noStrike" spc="-1" dirty="0">
+                <a:solidFill>
+                  <a:srgbClr val="000000"/>
+                </a:solidFill>
+                <a:uFill>
+                  <a:solidFill>
+                    <a:srgbClr val="FFFFFF"/>
+                  </a:solidFill>
+                </a:uFill>
+                <a:latin typeface="Calibri"/>
+                <a:ea typeface="DejaVu Sans"/>
+              </a:rPr>
+              <a:t> de Informatica</a:t>
+            </a:r>
+            <a:endParaRPr lang="en-US" sz="1800" b="0" strike="noStrike" spc="-1" dirty="0">
               <a:solidFill>
                 <a:srgbClr val="000000"/>
               </a:solidFill>
@@ -4565,7 +4610,7 @@
               </a:lnSpc>
             </a:pPr>
             <a:r>
-              <a:rPr lang="en-US" sz="2400" b="0" strike="noStrike" spc="-1">
+              <a:rPr lang="en-US" sz="2400" b="0" strike="noStrike" spc="-1" dirty="0" err="1">
                 <a:solidFill>
                   <a:srgbClr val="000000"/>
                 </a:solidFill>
@@ -4577,9 +4622,114 @@
                 <a:latin typeface="Calibri"/>
                 <a:ea typeface="DejaVu Sans"/>
               </a:rPr>
-              <a:t>Instrumente si tehnici de baza in informatica</a:t>
-            </a:r>
-            <a:endParaRPr lang="en-US" sz="1800" b="0" strike="noStrike" spc="-1">
+              <a:t>Instrumente</a:t>
+            </a:r>
+            <a:r>
+              <a:rPr lang="en-US" sz="2400" b="0" strike="noStrike" spc="-1" dirty="0">
+                <a:solidFill>
+                  <a:srgbClr val="000000"/>
+                </a:solidFill>
+                <a:uFill>
+                  <a:solidFill>
+                    <a:srgbClr val="FFFFFF"/>
+                  </a:solidFill>
+                </a:uFill>
+                <a:latin typeface="Calibri"/>
+                <a:ea typeface="DejaVu Sans"/>
+              </a:rPr>
+              <a:t> </a:t>
+            </a:r>
+            <a:r>
+              <a:rPr lang="en-US" sz="2400" b="0" strike="noStrike" spc="-1" dirty="0" err="1">
+                <a:solidFill>
+                  <a:srgbClr val="000000"/>
+                </a:solidFill>
+                <a:uFill>
+                  <a:solidFill>
+                    <a:srgbClr val="FFFFFF"/>
+                  </a:solidFill>
+                </a:uFill>
+                <a:latin typeface="Calibri"/>
+                <a:ea typeface="DejaVu Sans"/>
+              </a:rPr>
+              <a:t>si</a:t>
+            </a:r>
+            <a:r>
+              <a:rPr lang="en-US" sz="2400" b="0" strike="noStrike" spc="-1" dirty="0">
+                <a:solidFill>
+                  <a:srgbClr val="000000"/>
+                </a:solidFill>
+                <a:uFill>
+                  <a:solidFill>
+                    <a:srgbClr val="FFFFFF"/>
+                  </a:solidFill>
+                </a:uFill>
+                <a:latin typeface="Calibri"/>
+                <a:ea typeface="DejaVu Sans"/>
+              </a:rPr>
+              <a:t> </a:t>
+            </a:r>
+            <a:r>
+              <a:rPr lang="en-US" sz="2400" b="0" strike="noStrike" spc="-1" dirty="0" err="1">
+                <a:solidFill>
+                  <a:srgbClr val="000000"/>
+                </a:solidFill>
+                <a:uFill>
+                  <a:solidFill>
+                    <a:srgbClr val="FFFFFF"/>
+                  </a:solidFill>
+                </a:uFill>
+                <a:latin typeface="Calibri"/>
+                <a:ea typeface="DejaVu Sans"/>
+              </a:rPr>
+              <a:t>tehnici</a:t>
+            </a:r>
+            <a:r>
+              <a:rPr lang="en-US" sz="2400" b="0" strike="noStrike" spc="-1" dirty="0">
+                <a:solidFill>
+                  <a:srgbClr val="000000"/>
+                </a:solidFill>
+                <a:uFill>
+                  <a:solidFill>
+                    <a:srgbClr val="FFFFFF"/>
+                  </a:solidFill>
+                </a:uFill>
+                <a:latin typeface="Calibri"/>
+                <a:ea typeface="DejaVu Sans"/>
+              </a:rPr>
+              <a:t> de </a:t>
+            </a:r>
+            <a:r>
+              <a:rPr lang="en-US" sz="2400" b="0" strike="noStrike" spc="-1" dirty="0" err="1">
+                <a:solidFill>
+                  <a:srgbClr val="000000"/>
+                </a:solidFill>
+                <a:uFill>
+                  <a:solidFill>
+                    <a:srgbClr val="FFFFFF"/>
+                  </a:solidFill>
+                </a:uFill>
+                <a:latin typeface="Calibri"/>
+                <a:ea typeface="DejaVu Sans"/>
+              </a:rPr>
+              <a:t>baza</a:t>
+            </a:r>
+            <a:r>
+              <a:rPr lang="en-US" sz="2400" b="0" strike="noStrike" spc="-1" dirty="0">
+                <a:solidFill>
+                  <a:srgbClr val="000000"/>
+                </a:solidFill>
+                <a:uFill>
+                  <a:solidFill>
+                    <a:srgbClr val="FFFFFF"/>
+                  </a:solidFill>
+                </a:uFill>
+                <a:latin typeface="Calibri"/>
+                <a:ea typeface="DejaVu Sans"/>
+              </a:rPr>
+              <a:t> in informatica</a:t>
+            </a:r>
+            <a:endParaRPr lang="en-US" sz="1800" b="0" strike="noStrike" spc="-1" dirty="0">
               <a:solidFill>
                 <a:srgbClr val="000000"/>
               </a:solidFill>
@@ -4598,7 +4748,7 @@
               </a:lnSpc>
             </a:pPr>
             <a:r>
-              <a:rPr lang="en-US" sz="2400" b="0" strike="noStrike" spc="-1">
+              <a:rPr lang="en-US" sz="2400" b="0" strike="noStrike" spc="-1" dirty="0">
                 <a:solidFill>
                   <a:srgbClr val="000000"/>
                 </a:solidFill>
@@ -4612,7 +4762,7 @@
               </a:rPr>
               <a:t>2025-2026</a:t>
             </a:r>
-            <a:endParaRPr lang="en-US" sz="1800" b="0" strike="noStrike" spc="-1">
+            <a:endParaRPr lang="en-US" sz="1800" b="0" strike="noStrike" spc="-1" dirty="0">
               <a:solidFill>
                 <a:srgbClr val="000000"/>
               </a:solidFill>
@@ -4793,7 +4943,7 @@
               <a:buChar char="•"/>
             </a:pPr>
             <a:r>
-              <a:rPr lang="ro-RO" sz="2400" b="0" strike="noStrike" spc="-1" dirty="0" smtClean="0">
+              <a:rPr lang="ro-RO" sz="2400" b="0" strike="noStrike" spc="-1" dirty="0">
                 <a:solidFill>
                   <a:srgbClr val="000000"/>
                 </a:solidFill>
@@ -4807,7 +4957,7 @@
               <a:t>Contextul emulării comportamentului recursiv al </a:t>
             </a:r>
             <a:r>
-              <a:rPr lang="ro-RO" sz="2400" b="1" strike="noStrike" spc="-1" dirty="0" smtClean="0">
+              <a:rPr lang="ro-RO" sz="2400" b="1" strike="noStrike" spc="-1" dirty="0">
                 <a:solidFill>
                   <a:srgbClr val="000000"/>
                 </a:solidFill>
@@ -4820,7 +4970,7 @@
               </a:rPr>
               <a:t>wget</a:t>
             </a:r>
-            <a:endParaRPr lang="ro-RO" sz="2400" strike="noStrike" spc="-1" dirty="0" smtClean="0">
+            <a:endParaRPr lang="ro-RO" sz="2400" strike="noStrike" spc="-1" dirty="0">
               <a:solidFill>
                 <a:srgbClr val="000000"/>
               </a:solidFill>
@@ -4844,7 +4994,7 @@
               <a:buChar char="•"/>
             </a:pPr>
             <a:r>
-              <a:rPr lang="ro-RO" sz="2400" b="0" spc="-1" dirty="0" smtClean="0">
+              <a:rPr lang="ro-RO" sz="2400" b="0" spc="-1" dirty="0">
                 <a:solidFill>
                   <a:srgbClr val="000000"/>
                 </a:solidFill>
@@ -4858,20 +5008,20 @@
               <a:t>Obiectivele proiectului și cerințele funcționale ale scriptului </a:t>
             </a:r>
             <a:r>
-              <a:rPr lang="ro-RO" sz="2400" b="1" spc="-1" dirty="0" smtClean="0">
-                <a:solidFill>
-                  <a:srgbClr val="000000"/>
-                </a:solidFill>
-                <a:uFill>
-                  <a:solidFill>
-                    <a:srgbClr val="FFFFFF"/>
-                  </a:solidFill>
-                </a:uFill>
-                <a:latin typeface="Arial"/>
-              </a:rPr>
-              <a:t>lwget.sh</a:t>
-            </a:r>
-            <a:endParaRPr lang="ro-RO" sz="2400" spc="-1" dirty="0" smtClean="0">
+              <a:rPr lang="ro-RO" sz="2400" b="1" spc="-1" dirty="0" err="1">
+                <a:solidFill>
+                  <a:srgbClr val="000000"/>
+                </a:solidFill>
+                <a:uFill>
+                  <a:solidFill>
+                    <a:srgbClr val="FFFFFF"/>
+                  </a:solidFill>
+                </a:uFill>
+                <a:latin typeface="Arial"/>
+              </a:rPr>
+              <a:t>lget.sh</a:t>
+            </a:r>
+            <a:endParaRPr lang="ro-RO" sz="2400" spc="-1" dirty="0">
               <a:solidFill>
                 <a:srgbClr val="000000"/>
               </a:solidFill>
@@ -4895,7 +5045,7 @@
               <a:buChar char="•"/>
             </a:pPr>
             <a:r>
-              <a:rPr lang="ro-RO" sz="2400" b="0" strike="noStrike" spc="-1" dirty="0" smtClean="0">
+              <a:rPr lang="ro-RO" sz="2400" b="0" strike="noStrike" spc="-1" dirty="0">
                 <a:solidFill>
                   <a:srgbClr val="000000"/>
                 </a:solidFill>
@@ -4921,18 +5071,18 @@
               <a:buChar char="•"/>
             </a:pPr>
             <a:r>
-              <a:rPr lang="ro-RO" sz="2400" spc="-1" dirty="0" smtClean="0">
-                <a:solidFill>
-                  <a:srgbClr val="000000"/>
-                </a:solidFill>
-                <a:uFill>
-                  <a:solidFill>
-                    <a:srgbClr val="FFFFFF"/>
-                  </a:solidFill>
-                </a:uFill>
-                <a:latin typeface="Arial"/>
-              </a:rPr>
-              <a:t>Detalii despre scriptul Bash, tool-uri utilizate si gestionarea URL-urilor</a:t>
+              <a:rPr lang="ro-RO" sz="2400" spc="-1" dirty="0">
+                <a:solidFill>
+                  <a:srgbClr val="000000"/>
+                </a:solidFill>
+                <a:uFill>
+                  <a:solidFill>
+                    <a:srgbClr val="FFFFFF"/>
+                  </a:solidFill>
+                </a:uFill>
+                <a:latin typeface="Arial"/>
+              </a:rPr>
+              <a:t>Detalii despre scriptul Bash, tool-uri utilizate și gestionarea URL-urilor</a:t>
             </a:r>
           </a:p>
           <a:p>
@@ -4947,7 +5097,7 @@
               <a:buChar char="•"/>
             </a:pPr>
             <a:r>
-              <a:rPr lang="ro-RO" sz="2400" b="0" strike="noStrike" spc="-1" dirty="0" smtClean="0">
+              <a:rPr lang="ro-RO" sz="2400" b="0" strike="noStrike" spc="-1" dirty="0">
                 <a:solidFill>
                   <a:srgbClr val="000000"/>
                 </a:solidFill>
@@ -4961,7 +5111,7 @@
               <a:t>Scenarii de testare, verificare cu </a:t>
             </a:r>
             <a:r>
-              <a:rPr lang="ro-RO" sz="2400" b="1" strike="noStrike" spc="-1" dirty="0" smtClean="0">
+              <a:rPr lang="ro-RO" sz="2400" b="1" strike="noStrike" spc="-1" dirty="0">
                 <a:solidFill>
                   <a:srgbClr val="000000"/>
                 </a:solidFill>
@@ -4975,7 +5125,7 @@
               <a:t>tree </a:t>
             </a:r>
             <a:r>
-              <a:rPr lang="ro-RO" sz="2400" strike="noStrike" spc="-1" dirty="0" smtClean="0">
+              <a:rPr lang="ro-RO" sz="2400" strike="noStrike" spc="-1" dirty="0">
                 <a:solidFill>
                   <a:srgbClr val="000000"/>
                 </a:solidFill>
@@ -5001,7 +5151,7 @@
               <a:buChar char="•"/>
             </a:pPr>
             <a:r>
-              <a:rPr lang="ro-RO" sz="2400" spc="-1" dirty="0" smtClean="0">
+              <a:rPr lang="ro-RO" sz="2400" spc="-1" dirty="0">
                 <a:solidFill>
                   <a:srgbClr val="000000"/>
                 </a:solidFill>
@@ -5121,7 +5271,7 @@
               </a:lnSpc>
             </a:pPr>
             <a:r>
-              <a:rPr lang="en-US" sz="4400" b="0" strike="noStrike" spc="-1">
+              <a:rPr lang="en-US" sz="4400" b="0" strike="noStrike" spc="-1" dirty="0" err="1">
                 <a:solidFill>
                   <a:srgbClr val="000000"/>
                 </a:solidFill>
@@ -5133,9 +5283,39 @@
                 <a:latin typeface="Calibri Light"/>
                 <a:ea typeface="DejaVu Sans"/>
               </a:rPr>
-              <a:t>Descrierea problemei</a:t>
-            </a:r>
-            <a:endParaRPr lang="en-US" sz="1800" b="0" strike="noStrike" spc="-1">
+              <a:t>Descrierea</a:t>
+            </a:r>
+            <a:r>
+              <a:rPr lang="en-US" sz="4400" b="0" strike="noStrike" spc="-1" dirty="0">
+                <a:solidFill>
+                  <a:srgbClr val="000000"/>
+                </a:solidFill>
+                <a:uFill>
+                  <a:solidFill>
+                    <a:srgbClr val="FFFFFF"/>
+                  </a:solidFill>
+                </a:uFill>
+                <a:latin typeface="Calibri Light"/>
+                <a:ea typeface="DejaVu Sans"/>
+              </a:rPr>
+              <a:t> </a:t>
+            </a:r>
+            <a:r>
+              <a:rPr lang="en-US" sz="4400" b="0" strike="noStrike" spc="-1" dirty="0" err="1">
+                <a:solidFill>
+                  <a:srgbClr val="000000"/>
+                </a:solidFill>
+                <a:uFill>
+                  <a:solidFill>
+                    <a:srgbClr val="FFFFFF"/>
+                  </a:solidFill>
+                </a:uFill>
+                <a:latin typeface="Calibri Light"/>
+                <a:ea typeface="DejaVu Sans"/>
+              </a:rPr>
+              <a:t>problemei</a:t>
+            </a:r>
+            <a:endParaRPr lang="en-US" sz="1800" b="0" strike="noStrike" spc="-1" dirty="0">
               <a:solidFill>
                 <a:srgbClr val="000000"/>
               </a:solidFill>
@@ -5195,17 +5375,18 @@
               <a:buChar char="•"/>
             </a:pPr>
             <a:r>
-              <a:rPr lang="ro-RO" sz="2000" b="0" strike="noStrike" spc="-1" dirty="0" smtClean="0">
-                <a:solidFill>
-                  <a:srgbClr val="000000"/>
-                </a:solidFill>
-                <a:uFill>
-                  <a:solidFill>
-                    <a:srgbClr val="FFFFFF"/>
-                  </a:solidFill>
-                </a:uFill>
-                <a:latin typeface="Calibri"/>
+              <a:rPr lang="ro-RO" sz="2000" b="0" strike="noStrike" spc="-1" dirty="0">
+                <a:solidFill>
+                  <a:srgbClr val="000000"/>
+                </a:solidFill>
+                <a:uFill>
+                  <a:solidFill>
+                    <a:srgbClr val="FFFFFF"/>
+                  </a:solidFill>
+                </a:uFill>
+                <a:latin typeface="Arial" panose="020B0604020202020204" pitchFamily="34" charset="0"/>
                 <a:ea typeface="DejaVu Sans"/>
+                <a:cs typeface="Arial" panose="020B0604020202020204" pitchFamily="34" charset="0"/>
               </a:rPr>
               <a:t>Context general</a:t>
             </a:r>
@@ -5222,74 +5403,79 @@
               <a:buChar char="•"/>
             </a:pPr>
             <a:r>
-              <a:rPr lang="ro-RO" sz="1600" spc="-1" dirty="0" smtClean="0">
-                <a:solidFill>
-                  <a:srgbClr val="000000"/>
-                </a:solidFill>
-                <a:uFill>
-                  <a:solidFill>
-                    <a:srgbClr val="FFFFFF"/>
-                  </a:solidFill>
-                </a:uFill>
-                <a:latin typeface="Calibri"/>
+              <a:rPr lang="ro-RO" sz="1600" spc="-1" dirty="0">
+                <a:solidFill>
+                  <a:srgbClr val="000000"/>
+                </a:solidFill>
+                <a:uFill>
+                  <a:solidFill>
+                    <a:srgbClr val="FFFFFF"/>
+                  </a:solidFill>
+                </a:uFill>
+                <a:latin typeface="Arial" panose="020B0604020202020204" pitchFamily="34" charset="0"/>
+                <a:cs typeface="Arial" panose="020B0604020202020204" pitchFamily="34" charset="0"/>
               </a:rPr>
               <a:t>Problema se incadrează în zona de </a:t>
             </a:r>
             <a:r>
-              <a:rPr lang="ro-RO" sz="1600" spc="-1" dirty="0" smtClean="0">
-                <a:solidFill>
-                  <a:srgbClr val="000000"/>
-                </a:solidFill>
-                <a:uFill>
-                  <a:solidFill>
-                    <a:srgbClr val="FFFFFF"/>
-                  </a:solidFill>
-                </a:uFill>
-                <a:latin typeface="Calibri"/>
+              <a:rPr lang="ro-RO" sz="1600" spc="-1" dirty="0">
+                <a:solidFill>
+                  <a:srgbClr val="000000"/>
+                </a:solidFill>
+                <a:uFill>
+                  <a:solidFill>
+                    <a:srgbClr val="FFFFFF"/>
+                  </a:solidFill>
+                </a:uFill>
+                <a:latin typeface="Arial" panose="020B0604020202020204" pitchFamily="34" charset="0"/>
+                <a:cs typeface="Arial" panose="020B0604020202020204" pitchFamily="34" charset="0"/>
                 <a:hlinkClick r:id="rId2"/>
               </a:rPr>
               <a:t>Web Crawling</a:t>
             </a:r>
             <a:r>
-              <a:rPr lang="ro-RO" sz="1600" spc="-1" dirty="0" smtClean="0">
-                <a:solidFill>
-                  <a:srgbClr val="000000"/>
-                </a:solidFill>
-                <a:uFill>
-                  <a:solidFill>
-                    <a:srgbClr val="FFFFFF"/>
-                  </a:solidFill>
-                </a:uFill>
-                <a:latin typeface="Calibri"/>
+              <a:rPr lang="ro-RO" sz="1600" spc="-1" dirty="0">
+                <a:solidFill>
+                  <a:srgbClr val="000000"/>
+                </a:solidFill>
+                <a:uFill>
+                  <a:solidFill>
+                    <a:srgbClr val="FFFFFF"/>
+                  </a:solidFill>
+                </a:uFill>
+                <a:latin typeface="Arial" panose="020B0604020202020204" pitchFamily="34" charset="0"/>
+                <a:cs typeface="Arial" panose="020B0604020202020204" pitchFamily="34" charset="0"/>
               </a:rPr>
               <a:t> și </a:t>
             </a:r>
             <a:r>
-              <a:rPr lang="ro-RO" sz="1600" spc="-1" dirty="0" smtClean="0">
-                <a:solidFill>
-                  <a:srgbClr val="000000"/>
-                </a:solidFill>
-                <a:uFill>
-                  <a:solidFill>
-                    <a:srgbClr val="FFFFFF"/>
-                  </a:solidFill>
-                </a:uFill>
-                <a:latin typeface="Calibri"/>
+              <a:rPr lang="ro-RO" sz="1600" spc="-1" dirty="0">
+                <a:solidFill>
+                  <a:srgbClr val="000000"/>
+                </a:solidFill>
+                <a:uFill>
+                  <a:solidFill>
+                    <a:srgbClr val="FFFFFF"/>
+                  </a:solidFill>
+                </a:uFill>
+                <a:latin typeface="Arial" panose="020B0604020202020204" pitchFamily="34" charset="0"/>
+                <a:cs typeface="Arial" panose="020B0604020202020204" pitchFamily="34" charset="0"/>
                 <a:hlinkClick r:id="rId3"/>
               </a:rPr>
               <a:t>Scripting în Linux</a:t>
             </a:r>
             <a:r>
-              <a:rPr lang="ro-RO" sz="1600" spc="-1" dirty="0" smtClean="0">
-                <a:solidFill>
-                  <a:srgbClr val="000000"/>
-                </a:solidFill>
-                <a:uFill>
-                  <a:solidFill>
-                    <a:srgbClr val="FFFFFF"/>
-                  </a:solidFill>
-                </a:uFill>
-                <a:latin typeface="Calibri"/>
+              <a:rPr lang="ro-RO" sz="1600" spc="-1" dirty="0">
+                <a:solidFill>
+                  <a:srgbClr val="000000"/>
+                </a:solidFill>
+                <a:uFill>
+                  <a:solidFill>
+                    <a:srgbClr val="FFFFFF"/>
+                  </a:solidFill>
+                </a:uFill>
+                <a:latin typeface="Arial" panose="020B0604020202020204" pitchFamily="34" charset="0"/>
+                <a:cs typeface="Arial" panose="020B0604020202020204" pitchFamily="34" charset="0"/>
               </a:rPr>
               <a:t>.</a:t>
             </a:r>
@@ -5306,20 +5492,21 @@
               <a:buChar char="•"/>
             </a:pPr>
             <a:r>
-              <a:rPr lang="ro-RO" sz="1600" b="0" strike="noStrike" spc="-1" dirty="0" smtClean="0">
-                <a:solidFill>
-                  <a:srgbClr val="000000"/>
-                </a:solidFill>
-                <a:uFill>
-                  <a:solidFill>
-                    <a:srgbClr val="FFFFFF"/>
-                  </a:solidFill>
-                </a:uFill>
-                <a:latin typeface="Calibri"/>
+              <a:rPr lang="ro-RO" sz="1600" b="0" strike="noStrike" spc="-1" dirty="0">
+                <a:solidFill>
+                  <a:srgbClr val="000000"/>
+                </a:solidFill>
+                <a:uFill>
+                  <a:solidFill>
+                    <a:srgbClr val="FFFFFF"/>
+                  </a:solidFill>
+                </a:uFill>
+                <a:latin typeface="Arial" panose="020B0604020202020204" pitchFamily="34" charset="0"/>
+                <a:cs typeface="Arial" panose="020B0604020202020204" pitchFamily="34" charset="0"/>
               </a:rPr>
               <a:t>Implică automatizarea descărcării de resurse web și parcurgerea structurilor arborescente de documente.</a:t>
             </a:r>
-            <a:endParaRPr lang="ro-RO" sz="1600" spc="-1" dirty="0" smtClean="0">
+            <a:endParaRPr lang="ro-RO" sz="1600" spc="-1" dirty="0">
               <a:solidFill>
                 <a:srgbClr val="000000"/>
               </a:solidFill>
@@ -5328,7 +5515,8 @@
                   <a:srgbClr val="FFFFFF"/>
                 </a:solidFill>
               </a:uFill>
-              <a:latin typeface="Calibri"/>
+              <a:latin typeface="Arial" panose="020B0604020202020204" pitchFamily="34" charset="0"/>
+              <a:cs typeface="Arial" panose="020B0604020202020204" pitchFamily="34" charset="0"/>
             </a:endParaRPr>
           </a:p>
           <a:p>
@@ -5351,7 +5539,8 @@
                   <a:srgbClr val="FFFFFF"/>
                 </a:solidFill>
               </a:uFill>
-              <a:latin typeface="Calibri"/>
+              <a:latin typeface="Arial" panose="020B0604020202020204" pitchFamily="34" charset="0"/>
+              <a:cs typeface="Arial" panose="020B0604020202020204" pitchFamily="34" charset="0"/>
             </a:endParaRPr>
           </a:p>
           <a:p>
@@ -5366,16 +5555,17 @@
               <a:buChar char="•"/>
             </a:pPr>
             <a:r>
-              <a:rPr lang="ro-RO" sz="2000" b="0" strike="noStrike" spc="-1" dirty="0" smtClean="0">
-                <a:solidFill>
-                  <a:srgbClr val="000000"/>
-                </a:solidFill>
-                <a:uFill>
-                  <a:solidFill>
-                    <a:srgbClr val="FFFFFF"/>
-                  </a:solidFill>
-                </a:uFill>
-                <a:latin typeface="Calibri"/>
+              <a:rPr lang="ro-RO" sz="2000" b="0" strike="noStrike" spc="-1" dirty="0">
+                <a:solidFill>
+                  <a:srgbClr val="000000"/>
+                </a:solidFill>
+                <a:uFill>
+                  <a:solidFill>
+                    <a:srgbClr val="FFFFFF"/>
+                  </a:solidFill>
+                </a:uFill>
+                <a:latin typeface="Arial" panose="020B0604020202020204" pitchFamily="34" charset="0"/>
+                <a:cs typeface="Arial" panose="020B0604020202020204" pitchFamily="34" charset="0"/>
               </a:rPr>
               <a:t>Datele particulare</a:t>
             </a:r>
@@ -5392,16 +5582,17 @@
               <a:buChar char="•"/>
             </a:pPr>
             <a:r>
-              <a:rPr lang="ro-RO" sz="1600" spc="-1" dirty="0" smtClean="0">
-                <a:solidFill>
-                  <a:srgbClr val="000000"/>
-                </a:solidFill>
-                <a:uFill>
-                  <a:solidFill>
-                    <a:srgbClr val="FFFFFF"/>
-                  </a:solidFill>
-                </a:uFill>
-                <a:latin typeface="Calibri"/>
+              <a:rPr lang="ro-RO" sz="1600" spc="-1" dirty="0">
+                <a:solidFill>
+                  <a:srgbClr val="000000"/>
+                </a:solidFill>
+                <a:uFill>
+                  <a:solidFill>
+                    <a:srgbClr val="FFFFFF"/>
+                  </a:solidFill>
+                </a:uFill>
+                <a:latin typeface="Arial" panose="020B0604020202020204" pitchFamily="34" charset="0"/>
+                <a:cs typeface="Arial" panose="020B0604020202020204" pitchFamily="34" charset="0"/>
               </a:rPr>
               <a:t>Se dorește o abordare „leneșă”. Scriptul nu trebuie să descarce automat totul, ci doar nivelul curent și să pregăteasca lista de resurse pentru următoarea execuție.</a:t>
             </a:r>
@@ -5426,7 +5617,8 @@
                   <a:srgbClr val="FFFFFF"/>
                 </a:solidFill>
               </a:uFill>
-              <a:latin typeface="Calibri"/>
+              <a:latin typeface="Arial" panose="020B0604020202020204" pitchFamily="34" charset="0"/>
+              <a:cs typeface="Arial" panose="020B0604020202020204" pitchFamily="34" charset="0"/>
             </a:endParaRPr>
           </a:p>
           <a:p>
@@ -5441,16 +5633,17 @@
               <a:buChar char="•"/>
             </a:pPr>
             <a:r>
-              <a:rPr lang="ro-RO" sz="2000" spc="-1" dirty="0" smtClean="0">
-                <a:solidFill>
-                  <a:srgbClr val="000000"/>
-                </a:solidFill>
-                <a:uFill>
-                  <a:solidFill>
-                    <a:srgbClr val="FFFFFF"/>
-                  </a:solidFill>
-                </a:uFill>
-                <a:latin typeface="Calibri"/>
+              <a:rPr lang="ro-RO" sz="2000" spc="-1" dirty="0">
+                <a:solidFill>
+                  <a:srgbClr val="000000"/>
+                </a:solidFill>
+                <a:uFill>
+                  <a:solidFill>
+                    <a:srgbClr val="FFFFFF"/>
+                  </a:solidFill>
+                </a:uFill>
+                <a:latin typeface="Arial" panose="020B0604020202020204" pitchFamily="34" charset="0"/>
+                <a:cs typeface="Arial" panose="020B0604020202020204" pitchFamily="34" charset="0"/>
               </a:rPr>
               <a:t>Necesitatea soluției</a:t>
             </a:r>
@@ -5467,16 +5660,17 @@
               <a:buChar char="•"/>
             </a:pPr>
             <a:r>
-              <a:rPr lang="ro-RO" sz="1600" b="0" strike="noStrike" spc="-1" dirty="0" smtClean="0">
-                <a:solidFill>
-                  <a:srgbClr val="000000"/>
-                </a:solidFill>
-                <a:uFill>
-                  <a:solidFill>
-                    <a:srgbClr val="FFFFFF"/>
-                  </a:solidFill>
-                </a:uFill>
-                <a:latin typeface="Calibri"/>
+              <a:rPr lang="ro-RO" sz="1600" b="0" strike="noStrike" spc="-1" dirty="0">
+                <a:solidFill>
+                  <a:srgbClr val="000000"/>
+                </a:solidFill>
+                <a:uFill>
+                  <a:solidFill>
+                    <a:srgbClr val="FFFFFF"/>
+                  </a:solidFill>
+                </a:uFill>
+                <a:latin typeface="Arial" panose="020B0604020202020204" pitchFamily="34" charset="0"/>
+                <a:cs typeface="Arial" panose="020B0604020202020204" pitchFamily="34" charset="0"/>
               </a:rPr>
               <a:t>Înțelegerea mecanismelor de parsing HTML și extragerea de link-uri.</a:t>
             </a:r>
@@ -5493,18 +5687,19 @@
               <a:buChar char="•"/>
             </a:pPr>
             <a:r>
-              <a:rPr lang="ro-RO" sz="1600" b="0" strike="noStrike" spc="-1" dirty="0" smtClean="0">
-                <a:solidFill>
-                  <a:srgbClr val="000000"/>
-                </a:solidFill>
-                <a:uFill>
-                  <a:solidFill>
-                    <a:srgbClr val="FFFFFF"/>
-                  </a:solidFill>
-                </a:uFill>
-                <a:latin typeface="Calibri"/>
-              </a:rPr>
-              <a:t>Gestionarea stării unei aplicații între execuții multiple (persistența cozii de procesare pe disc)</a:t>
+              <a:rPr lang="ro-RO" sz="1600" b="0" strike="noStrike" spc="-1" dirty="0">
+                <a:solidFill>
+                  <a:srgbClr val="000000"/>
+                </a:solidFill>
+                <a:uFill>
+                  <a:solidFill>
+                    <a:srgbClr val="FFFFFF"/>
+                  </a:solidFill>
+                </a:uFill>
+                <a:latin typeface="Arial" panose="020B0604020202020204" pitchFamily="34" charset="0"/>
+                <a:cs typeface="Arial" panose="020B0604020202020204" pitchFamily="34" charset="0"/>
+              </a:rPr>
+              <a:t>Gestionarea stării unei aplicații între execuții multiple (persistența cozii de procesare pe disc).</a:t>
             </a:r>
           </a:p>
           <a:p>
@@ -5518,6 +5713,45 @@
               <a:buFont typeface="Arial"/>
               <a:buChar char="•"/>
             </a:pPr>
+            <a:r>
+              <a:rPr lang="ro-RO" sz="1600" spc="-1" dirty="0">
+                <a:solidFill>
+                  <a:srgbClr val="000000"/>
+                </a:solidFill>
+                <a:uFill>
+                  <a:solidFill>
+                    <a:srgbClr val="FFFFFF"/>
+                  </a:solidFill>
+                </a:uFill>
+                <a:latin typeface="Arial" panose="020B0604020202020204" pitchFamily="34" charset="0"/>
+                <a:cs typeface="Arial" panose="020B0604020202020204" pitchFamily="34" charset="0"/>
+              </a:rPr>
+              <a:t>Descărcarea directă a resurselor web.</a:t>
+            </a:r>
+            <a:endParaRPr lang="ro-RO" sz="1600" b="0" strike="noStrike" spc="-1" dirty="0">
+              <a:solidFill>
+                <a:srgbClr val="000000"/>
+              </a:solidFill>
+              <a:uFill>
+                <a:solidFill>
+                  <a:srgbClr val="FFFFFF"/>
+                </a:solidFill>
+              </a:uFill>
+              <a:latin typeface="Arial" panose="020B0604020202020204" pitchFamily="34" charset="0"/>
+              <a:cs typeface="Arial" panose="020B0604020202020204" pitchFamily="34" charset="0"/>
+            </a:endParaRPr>
+          </a:p>
+          <a:p>
+            <a:pPr marL="685800" lvl="1" indent="-226440">
+              <a:lnSpc>
+                <a:spcPct val="90000"/>
+              </a:lnSpc>
+              <a:buClr>
+                <a:srgbClr val="000000"/>
+              </a:buClr>
+              <a:buFont typeface="Arial"/>
+              <a:buChar char="•"/>
+            </a:pPr>
             <a:endParaRPr lang="ro-RO" sz="1600" spc="-1" dirty="0">
               <a:solidFill>
                 <a:srgbClr val="000000"/>
@@ -5527,7 +5761,8 @@
                   <a:srgbClr val="FFFFFF"/>
                 </a:solidFill>
               </a:uFill>
-              <a:latin typeface="Calibri"/>
+              <a:latin typeface="Arial" panose="020B0604020202020204" pitchFamily="34" charset="0"/>
+              <a:cs typeface="Arial" panose="020B0604020202020204" pitchFamily="34" charset="0"/>
             </a:endParaRPr>
           </a:p>
           <a:p>
@@ -5542,16 +5777,17 @@
               <a:buChar char="•"/>
             </a:pPr>
             <a:r>
-              <a:rPr lang="ro-RO" sz="2000" b="0" strike="noStrike" spc="-1" dirty="0" smtClean="0">
-                <a:solidFill>
-                  <a:srgbClr val="000000"/>
-                </a:solidFill>
-                <a:uFill>
-                  <a:solidFill>
-                    <a:srgbClr val="FFFFFF"/>
-                  </a:solidFill>
-                </a:uFill>
-                <a:latin typeface="Calibri"/>
+              <a:rPr lang="ro-RO" sz="2000" b="0" strike="noStrike" spc="-1" dirty="0">
+                <a:solidFill>
+                  <a:srgbClr val="000000"/>
+                </a:solidFill>
+                <a:uFill>
+                  <a:solidFill>
+                    <a:srgbClr val="FFFFFF"/>
+                  </a:solidFill>
+                </a:uFill>
+                <a:latin typeface="Arial" panose="020B0604020202020204" pitchFamily="34" charset="0"/>
+                <a:cs typeface="Arial" panose="020B0604020202020204" pitchFamily="34" charset="0"/>
               </a:rPr>
               <a:t>Soluția aleasă</a:t>
             </a:r>
@@ -5568,48 +5804,51 @@
               <a:buChar char="•"/>
             </a:pPr>
             <a:r>
-              <a:rPr lang="ro-RO" sz="1600" spc="-1" dirty="0" smtClean="0">
-                <a:solidFill>
-                  <a:srgbClr val="000000"/>
-                </a:solidFill>
-                <a:uFill>
-                  <a:solidFill>
-                    <a:srgbClr val="FFFFFF"/>
-                  </a:solidFill>
-                </a:uFill>
-                <a:latin typeface="Calibri"/>
+              <a:rPr lang="ro-RO" sz="1600" spc="-1" dirty="0">
+                <a:solidFill>
+                  <a:srgbClr val="000000"/>
+                </a:solidFill>
+                <a:uFill>
+                  <a:solidFill>
+                    <a:srgbClr val="FFFFFF"/>
+                  </a:solidFill>
+                </a:uFill>
+                <a:latin typeface="Arial" panose="020B0604020202020204" pitchFamily="34" charset="0"/>
+                <a:cs typeface="Arial" panose="020B0604020202020204" pitchFamily="34" charset="0"/>
               </a:rPr>
               <a:t>Un script Shell care utilizează </a:t>
             </a:r>
             <a:r>
-              <a:rPr lang="ro-RO" sz="1600" b="1" spc="-1" dirty="0" smtClean="0">
-                <a:solidFill>
-                  <a:srgbClr val="000000"/>
-                </a:solidFill>
-                <a:uFill>
-                  <a:solidFill>
-                    <a:srgbClr val="FFFFFF"/>
-                  </a:solidFill>
-                </a:uFill>
-                <a:latin typeface="Calibri"/>
+              <a:rPr lang="ro-RO" sz="1600" b="1" spc="-1" dirty="0">
+                <a:solidFill>
+                  <a:srgbClr val="000000"/>
+                </a:solidFill>
+                <a:uFill>
+                  <a:solidFill>
+                    <a:srgbClr val="FFFFFF"/>
+                  </a:solidFill>
+                </a:uFill>
+                <a:latin typeface="Arial" panose="020B0604020202020204" pitchFamily="34" charset="0"/>
+                <a:cs typeface="Arial" panose="020B0604020202020204" pitchFamily="34" charset="0"/>
               </a:rPr>
               <a:t>wget </a:t>
             </a:r>
             <a:r>
-              <a:rPr lang="ro-RO" sz="1600" spc="-1" dirty="0" smtClean="0">
-                <a:solidFill>
-                  <a:srgbClr val="000000"/>
-                </a:solidFill>
-                <a:uFill>
-                  <a:solidFill>
-                    <a:srgbClr val="FFFFFF"/>
-                  </a:solidFill>
-                </a:uFill>
-                <a:latin typeface="Calibri"/>
-              </a:rPr>
-              <a:t>în mod nerecursiv și gestionează manual coada de URL-uri</a:t>
-            </a:r>
-            <a:endParaRPr lang="ro-RO" sz="1600" strike="noStrike" spc="-1" dirty="0" smtClean="0">
+              <a:rPr lang="ro-RO" sz="1600" spc="-1" dirty="0">
+                <a:solidFill>
+                  <a:srgbClr val="000000"/>
+                </a:solidFill>
+                <a:uFill>
+                  <a:solidFill>
+                    <a:srgbClr val="FFFFFF"/>
+                  </a:solidFill>
+                </a:uFill>
+                <a:latin typeface="Arial" panose="020B0604020202020204" pitchFamily="34" charset="0"/>
+                <a:cs typeface="Arial" panose="020B0604020202020204" pitchFamily="34" charset="0"/>
+              </a:rPr>
+              <a:t>în mod nerecursiv și gestionează manual coada de URL-uri.</a:t>
+            </a:r>
+            <a:endParaRPr lang="ro-RO" sz="1600" strike="noStrike" spc="-1" dirty="0">
               <a:solidFill>
                 <a:srgbClr val="000000"/>
               </a:solidFill>
@@ -5618,7 +5857,8 @@
                   <a:srgbClr val="FFFFFF"/>
                 </a:solidFill>
               </a:uFill>
-              <a:latin typeface="Calibri"/>
+              <a:latin typeface="Arial" panose="020B0604020202020204" pitchFamily="34" charset="0"/>
+              <a:cs typeface="Arial" panose="020B0604020202020204" pitchFamily="34" charset="0"/>
             </a:endParaRPr>
           </a:p>
         </p:txBody>
@@ -5716,7 +5956,7 @@
               </a:lnSpc>
             </a:pPr>
             <a:r>
-              <a:rPr lang="en-US" sz="4400" b="0" strike="noStrike" spc="-1">
+              <a:rPr lang="en-US" sz="4400" b="0" strike="noStrike" spc="-1" dirty="0" err="1">
                 <a:solidFill>
                   <a:srgbClr val="000000"/>
                 </a:solidFill>
@@ -5728,9 +5968,39 @@
                 <a:latin typeface="Calibri Light"/>
                 <a:ea typeface="DejaVu Sans"/>
               </a:rPr>
-              <a:t>Specificatia solutiei</a:t>
-            </a:r>
-            <a:endParaRPr lang="en-US" sz="1800" b="0" strike="noStrike" spc="-1">
+              <a:t>Specificația</a:t>
+            </a:r>
+            <a:r>
+              <a:rPr lang="en-US" sz="4400" b="0" strike="noStrike" spc="-1" dirty="0">
+                <a:solidFill>
+                  <a:srgbClr val="000000"/>
+                </a:solidFill>
+                <a:uFill>
+                  <a:solidFill>
+                    <a:srgbClr val="FFFFFF"/>
+                  </a:solidFill>
+                </a:uFill>
+                <a:latin typeface="Calibri Light"/>
+                <a:ea typeface="DejaVu Sans"/>
+              </a:rPr>
+              <a:t> </a:t>
+            </a:r>
+            <a:r>
+              <a:rPr lang="en-US" sz="4400" b="0" strike="noStrike" spc="-1" dirty="0" err="1">
+                <a:solidFill>
+                  <a:srgbClr val="000000"/>
+                </a:solidFill>
+                <a:uFill>
+                  <a:solidFill>
+                    <a:srgbClr val="FFFFFF"/>
+                  </a:solidFill>
+                </a:uFill>
+                <a:latin typeface="Calibri Light"/>
+                <a:ea typeface="DejaVu Sans"/>
+              </a:rPr>
+              <a:t>soluției</a:t>
+            </a:r>
+            <a:endParaRPr lang="en-US" sz="1800" b="0" strike="noStrike" spc="-1" dirty="0">
               <a:solidFill>
                 <a:srgbClr val="000000"/>
               </a:solidFill>
@@ -5790,16 +6060,17 @@
               <a:buChar char="•"/>
             </a:pPr>
             <a:r>
-              <a:rPr lang="ro-RO" sz="2000" b="0" strike="noStrike" spc="-1" dirty="0" smtClean="0">
-                <a:solidFill>
-                  <a:srgbClr val="000000"/>
-                </a:solidFill>
-                <a:uFill>
-                  <a:solidFill>
-                    <a:srgbClr val="FFFFFF"/>
-                  </a:solidFill>
-                </a:uFill>
-                <a:latin typeface="Arial"/>
+              <a:rPr lang="ro-RO" sz="2000" b="0" strike="noStrike" spc="-1" dirty="0">
+                <a:solidFill>
+                  <a:srgbClr val="000000"/>
+                </a:solidFill>
+                <a:uFill>
+                  <a:solidFill>
+                    <a:srgbClr val="FFFFFF"/>
+                  </a:solidFill>
+                </a:uFill>
+                <a:latin typeface="Arial" panose="020B0604020202020204" pitchFamily="34" charset="0"/>
+                <a:cs typeface="Arial" panose="020B0604020202020204" pitchFamily="34" charset="0"/>
               </a:rPr>
               <a:t>Obiective</a:t>
             </a:r>
@@ -5816,44 +6087,47 @@
               <a:buChar char="•"/>
             </a:pPr>
             <a:r>
-              <a:rPr lang="ro-RO" sz="1600" spc="-1" dirty="0" smtClean="0">
-                <a:solidFill>
-                  <a:srgbClr val="000000"/>
-                </a:solidFill>
-                <a:uFill>
-                  <a:solidFill>
-                    <a:srgbClr val="FFFFFF"/>
-                  </a:solidFill>
-                </a:uFill>
-                <a:latin typeface="Arial"/>
+              <a:rPr lang="ro-RO" sz="1600" spc="-1" dirty="0">
+                <a:solidFill>
+                  <a:srgbClr val="000000"/>
+                </a:solidFill>
+                <a:uFill>
+                  <a:solidFill>
+                    <a:srgbClr val="FFFFFF"/>
+                  </a:solidFill>
+                </a:uFill>
+                <a:latin typeface="Arial" panose="020B0604020202020204" pitchFamily="34" charset="0"/>
+                <a:cs typeface="Arial" panose="020B0604020202020204" pitchFamily="34" charset="0"/>
               </a:rPr>
               <a:t>Crearea unui script care emulează </a:t>
             </a:r>
             <a:r>
-              <a:rPr lang="ro-RO" sz="1600" b="1" spc="-1" dirty="0" smtClean="0">
-                <a:solidFill>
-                  <a:srgbClr val="000000"/>
-                </a:solidFill>
-                <a:uFill>
-                  <a:solidFill>
-                    <a:srgbClr val="FFFFFF"/>
-                  </a:solidFill>
-                </a:uFill>
-                <a:latin typeface="Arial"/>
+              <a:rPr lang="ro-RO" sz="1600" b="1" spc="-1" dirty="0">
+                <a:solidFill>
+                  <a:srgbClr val="000000"/>
+                </a:solidFill>
+                <a:uFill>
+                  <a:solidFill>
+                    <a:srgbClr val="FFFFFF"/>
+                  </a:solidFill>
+                </a:uFill>
+                <a:latin typeface="Arial" panose="020B0604020202020204" pitchFamily="34" charset="0"/>
+                <a:cs typeface="Arial" panose="020B0604020202020204" pitchFamily="34" charset="0"/>
               </a:rPr>
               <a:t>wget –r</a:t>
             </a:r>
             <a:r>
-              <a:rPr lang="ro-RO" sz="1600" spc="-1" dirty="0" smtClean="0">
-                <a:solidFill>
-                  <a:srgbClr val="000000"/>
-                </a:solidFill>
-                <a:uFill>
-                  <a:solidFill>
-                    <a:srgbClr val="FFFFFF"/>
-                  </a:solidFill>
-                </a:uFill>
-                <a:latin typeface="Arial"/>
+              <a:rPr lang="ro-RO" sz="1600" spc="-1" dirty="0">
+                <a:solidFill>
+                  <a:srgbClr val="000000"/>
+                </a:solidFill>
+                <a:uFill>
+                  <a:solidFill>
+                    <a:srgbClr val="FFFFFF"/>
+                  </a:solidFill>
+                </a:uFill>
+                <a:latin typeface="Arial" panose="020B0604020202020204" pitchFamily="34" charset="0"/>
+                <a:cs typeface="Arial" panose="020B0604020202020204" pitchFamily="34" charset="0"/>
               </a:rPr>
               <a:t> prin apeluri repetate.</a:t>
             </a:r>
@@ -5870,16 +6144,17 @@
               <a:buChar char="•"/>
             </a:pPr>
             <a:r>
-              <a:rPr lang="ro-RO" sz="1600" b="0" strike="noStrike" spc="-1" dirty="0" smtClean="0">
-                <a:solidFill>
-                  <a:srgbClr val="000000"/>
-                </a:solidFill>
-                <a:uFill>
-                  <a:solidFill>
-                    <a:srgbClr val="FFFFFF"/>
-                  </a:solidFill>
-                </a:uFill>
-                <a:latin typeface="Arial"/>
+              <a:rPr lang="ro-RO" sz="1600" b="0" strike="noStrike" spc="-1" dirty="0">
+                <a:solidFill>
+                  <a:srgbClr val="000000"/>
+                </a:solidFill>
+                <a:uFill>
+                  <a:solidFill>
+                    <a:srgbClr val="FFFFFF"/>
+                  </a:solidFill>
+                </a:uFill>
+                <a:latin typeface="Arial" panose="020B0604020202020204" pitchFamily="34" charset="0"/>
+                <a:cs typeface="Arial" panose="020B0604020202020204" pitchFamily="34" charset="0"/>
               </a:rPr>
               <a:t>Fiecare apel trebuie să rezolve promisiunile (URL-urile) acumulate în pasul anterior.</a:t>
             </a:r>
@@ -5904,7 +6179,8 @@
                   <a:srgbClr val="FFFFFF"/>
                 </a:solidFill>
               </a:uFill>
-              <a:latin typeface="Arial"/>
+              <a:latin typeface="Arial" panose="020B0604020202020204" pitchFamily="34" charset="0"/>
+              <a:cs typeface="Arial" panose="020B0604020202020204" pitchFamily="34" charset="0"/>
             </a:endParaRPr>
           </a:p>
           <a:p>
@@ -5919,16 +6195,17 @@
               <a:buChar char="•"/>
             </a:pPr>
             <a:r>
-              <a:rPr lang="ro-RO" sz="2000" b="0" strike="noStrike" spc="-1" dirty="0" smtClean="0">
-                <a:solidFill>
-                  <a:srgbClr val="000000"/>
-                </a:solidFill>
-                <a:uFill>
-                  <a:solidFill>
-                    <a:srgbClr val="FFFFFF"/>
-                  </a:solidFill>
-                </a:uFill>
-                <a:latin typeface="Arial"/>
+              <a:rPr lang="ro-RO" sz="2000" b="0" strike="noStrike" spc="-1" dirty="0">
+                <a:solidFill>
+                  <a:srgbClr val="000000"/>
+                </a:solidFill>
+                <a:uFill>
+                  <a:solidFill>
+                    <a:srgbClr val="FFFFFF"/>
+                  </a:solidFill>
+                </a:uFill>
+                <a:latin typeface="Arial" panose="020B0604020202020204" pitchFamily="34" charset="0"/>
+                <a:cs typeface="Arial" panose="020B0604020202020204" pitchFamily="34" charset="0"/>
               </a:rPr>
               <a:t>Caracteristicile prototipului</a:t>
             </a:r>
@@ -5945,58 +6222,62 @@
               <a:buChar char="•"/>
             </a:pPr>
             <a:r>
-              <a:rPr lang="ro-RO" sz="1600" b="1" spc="-1" dirty="0" smtClean="0">
-                <a:solidFill>
-                  <a:srgbClr val="000000"/>
-                </a:solidFill>
-                <a:uFill>
-                  <a:solidFill>
-                    <a:srgbClr val="FFFFFF"/>
-                  </a:solidFill>
-                </a:uFill>
-                <a:latin typeface="Arial"/>
+              <a:rPr lang="ro-RO" sz="1600" b="1" spc="-1" dirty="0">
+                <a:solidFill>
+                  <a:srgbClr val="000000"/>
+                </a:solidFill>
+                <a:uFill>
+                  <a:solidFill>
+                    <a:srgbClr val="FFFFFF"/>
+                  </a:solidFill>
+                </a:uFill>
+                <a:latin typeface="Arial" panose="020B0604020202020204" pitchFamily="34" charset="0"/>
+                <a:cs typeface="Arial" panose="020B0604020202020204" pitchFamily="34" charset="0"/>
               </a:rPr>
               <a:t>Input: </a:t>
             </a:r>
             <a:r>
-              <a:rPr lang="ro-RO" sz="1600" spc="-1" dirty="0" smtClean="0">
-                <a:solidFill>
-                  <a:srgbClr val="000000"/>
-                </a:solidFill>
-                <a:uFill>
-                  <a:solidFill>
-                    <a:srgbClr val="FFFFFF"/>
-                  </a:solidFill>
-                </a:uFill>
-                <a:latin typeface="Arial"/>
+              <a:rPr lang="ro-RO" sz="1600" spc="-1" dirty="0">
+                <a:solidFill>
+                  <a:srgbClr val="000000"/>
+                </a:solidFill>
+                <a:uFill>
+                  <a:solidFill>
+                    <a:srgbClr val="FFFFFF"/>
+                  </a:solidFill>
+                </a:uFill>
+                <a:latin typeface="Arial" panose="020B0604020202020204" pitchFamily="34" charset="0"/>
+                <a:cs typeface="Arial" panose="020B0604020202020204" pitchFamily="34" charset="0"/>
               </a:rPr>
               <a:t>Un URL rădăcină (la prima rulare) sau procesarea fișierului </a:t>
             </a:r>
             <a:r>
-              <a:rPr lang="ro-RO" sz="1600" b="1" spc="-1" dirty="0" smtClean="0">
-                <a:solidFill>
-                  <a:srgbClr val="000000"/>
-                </a:solidFill>
-                <a:uFill>
-                  <a:solidFill>
-                    <a:srgbClr val="FFFFFF"/>
-                  </a:solidFill>
-                </a:uFill>
-                <a:latin typeface="Arial"/>
+              <a:rPr lang="ro-RO" sz="1600" b="1" spc="-1" dirty="0">
+                <a:solidFill>
+                  <a:srgbClr val="000000"/>
+                </a:solidFill>
+                <a:uFill>
+                  <a:solidFill>
+                    <a:srgbClr val="FFFFFF"/>
+                  </a:solidFill>
+                </a:uFill>
+                <a:latin typeface="Arial" panose="020B0604020202020204" pitchFamily="34" charset="0"/>
+                <a:cs typeface="Arial" panose="020B0604020202020204" pitchFamily="34" charset="0"/>
               </a:rPr>
               <a:t>promises.txt </a:t>
             </a:r>
             <a:r>
-              <a:rPr lang="ro-RO" sz="1600" spc="-1" dirty="0" smtClean="0">
-                <a:solidFill>
-                  <a:srgbClr val="000000"/>
-                </a:solidFill>
-                <a:uFill>
-                  <a:solidFill>
-                    <a:srgbClr val="FFFFFF"/>
-                  </a:solidFill>
-                </a:uFill>
-                <a:latin typeface="Arial"/>
+              <a:rPr lang="ro-RO" sz="1600" spc="-1" dirty="0">
+                <a:solidFill>
+                  <a:srgbClr val="000000"/>
+                </a:solidFill>
+                <a:uFill>
+                  <a:solidFill>
+                    <a:srgbClr val="FFFFFF"/>
+                  </a:solidFill>
+                </a:uFill>
+                <a:latin typeface="Arial" panose="020B0604020202020204" pitchFamily="34" charset="0"/>
+                <a:cs typeface="Arial" panose="020B0604020202020204" pitchFamily="34" charset="0"/>
               </a:rPr>
               <a:t>(la rulările ulterioare).</a:t>
             </a:r>
@@ -6013,30 +6294,32 @@
               <a:buChar char="•"/>
             </a:pPr>
             <a:r>
-              <a:rPr lang="ro-RO" sz="1600" b="1" strike="noStrike" spc="-1" dirty="0" smtClean="0">
-                <a:solidFill>
-                  <a:srgbClr val="000000"/>
-                </a:solidFill>
-                <a:uFill>
-                  <a:solidFill>
-                    <a:srgbClr val="FFFFFF"/>
-                  </a:solidFill>
-                </a:uFill>
-                <a:latin typeface="Arial"/>
+              <a:rPr lang="ro-RO" sz="1600" b="1" strike="noStrike" spc="-1" dirty="0">
+                <a:solidFill>
+                  <a:srgbClr val="000000"/>
+                </a:solidFill>
+                <a:uFill>
+                  <a:solidFill>
+                    <a:srgbClr val="FFFFFF"/>
+                  </a:solidFill>
+                </a:uFill>
+                <a:latin typeface="Arial" panose="020B0604020202020204" pitchFamily="34" charset="0"/>
+                <a:cs typeface="Arial" panose="020B0604020202020204" pitchFamily="34" charset="0"/>
               </a:rPr>
               <a:t>Output: </a:t>
             </a:r>
             <a:r>
-              <a:rPr lang="ro-RO" sz="1600" strike="noStrike" spc="-1" dirty="0" smtClean="0">
-                <a:solidFill>
-                  <a:srgbClr val="000000"/>
-                </a:solidFill>
-                <a:uFill>
-                  <a:solidFill>
-                    <a:srgbClr val="FFFFFF"/>
-                  </a:solidFill>
-                </a:uFill>
-                <a:latin typeface="Arial"/>
+              <a:rPr lang="ro-RO" sz="1600" strike="noStrike" spc="-1" dirty="0">
+                <a:solidFill>
+                  <a:srgbClr val="000000"/>
+                </a:solidFill>
+                <a:uFill>
+                  <a:solidFill>
+                    <a:srgbClr val="FFFFFF"/>
+                  </a:solidFill>
+                </a:uFill>
+                <a:latin typeface="Arial" panose="020B0604020202020204" pitchFamily="34" charset="0"/>
+                <a:cs typeface="Arial" panose="020B0604020202020204" pitchFamily="34" charset="0"/>
               </a:rPr>
               <a:t>O structură de directoare locală care mimează structura site-ului țintă.</a:t>
             </a:r>
@@ -6061,7 +6344,8 @@
                   <a:srgbClr val="FFFFFF"/>
                 </a:solidFill>
               </a:uFill>
-              <a:latin typeface="Arial"/>
+              <a:latin typeface="Arial" panose="020B0604020202020204" pitchFamily="34" charset="0"/>
+              <a:cs typeface="Arial" panose="020B0604020202020204" pitchFamily="34" charset="0"/>
             </a:endParaRPr>
           </a:p>
           <a:p>
@@ -6076,16 +6360,17 @@
               <a:buChar char="•"/>
             </a:pPr>
             <a:r>
-              <a:rPr lang="ro-RO" sz="2000" spc="-1" dirty="0" smtClean="0">
-                <a:solidFill>
-                  <a:srgbClr val="000000"/>
-                </a:solidFill>
-                <a:uFill>
-                  <a:solidFill>
-                    <a:srgbClr val="FFFFFF"/>
-                  </a:solidFill>
-                </a:uFill>
-                <a:latin typeface="Arial"/>
+              <a:rPr lang="ro-RO" sz="2000" spc="-1" dirty="0">
+                <a:solidFill>
+                  <a:srgbClr val="000000"/>
+                </a:solidFill>
+                <a:uFill>
+                  <a:solidFill>
+                    <a:srgbClr val="FFFFFF"/>
+                  </a:solidFill>
+                </a:uFill>
+                <a:latin typeface="Arial" panose="020B0604020202020204" pitchFamily="34" charset="0"/>
+                <a:cs typeface="Arial" panose="020B0604020202020204" pitchFamily="34" charset="0"/>
               </a:rPr>
               <a:t>Cerințe funcționale</a:t>
             </a:r>
@@ -6102,16 +6387,17 @@
               <a:buChar char="•"/>
             </a:pPr>
             <a:r>
-              <a:rPr lang="ro-RO" sz="1600" spc="-1" dirty="0" smtClean="0">
-                <a:solidFill>
-                  <a:srgbClr val="000000"/>
-                </a:solidFill>
-                <a:uFill>
-                  <a:solidFill>
-                    <a:srgbClr val="FFFFFF"/>
-                  </a:solidFill>
-                </a:uFill>
-                <a:latin typeface="Arial"/>
+              <a:rPr lang="ro-RO" sz="1600" spc="-1" dirty="0">
+                <a:solidFill>
+                  <a:srgbClr val="000000"/>
+                </a:solidFill>
+                <a:uFill>
+                  <a:solidFill>
+                    <a:srgbClr val="FFFFFF"/>
+                  </a:solidFill>
+                </a:uFill>
+                <a:latin typeface="Arial" panose="020B0604020202020204" pitchFamily="34" charset="0"/>
+                <a:cs typeface="Arial" panose="020B0604020202020204" pitchFamily="34" charset="0"/>
               </a:rPr>
               <a:t>Să descarce fișiere HTML.</a:t>
             </a:r>
@@ -6128,72 +6414,77 @@
               <a:buChar char="•"/>
             </a:pPr>
             <a:r>
-              <a:rPr lang="ro-RO" sz="1600" spc="-1" dirty="0" smtClean="0">
-                <a:solidFill>
-                  <a:srgbClr val="000000"/>
-                </a:solidFill>
-                <a:uFill>
-                  <a:solidFill>
-                    <a:srgbClr val="FFFFFF"/>
-                  </a:solidFill>
-                </a:uFill>
-                <a:latin typeface="Arial"/>
+              <a:rPr lang="ro-RO" sz="1600" spc="-1" dirty="0">
+                <a:solidFill>
+                  <a:srgbClr val="000000"/>
+                </a:solidFill>
+                <a:uFill>
+                  <a:solidFill>
+                    <a:srgbClr val="FFFFFF"/>
+                  </a:solidFill>
+                </a:uFill>
+                <a:latin typeface="Arial" panose="020B0604020202020204" pitchFamily="34" charset="0"/>
+                <a:cs typeface="Arial" panose="020B0604020202020204" pitchFamily="34" charset="0"/>
               </a:rPr>
               <a:t>Să parseze conținutul pentru a găsi tag-uri </a:t>
             </a:r>
             <a:r>
-              <a:rPr lang="ro-RO" sz="1600" b="1" spc="-1" dirty="0" smtClean="0">
-                <a:solidFill>
-                  <a:srgbClr val="000000"/>
-                </a:solidFill>
-                <a:uFill>
-                  <a:solidFill>
-                    <a:srgbClr val="FFFFFF"/>
-                  </a:solidFill>
-                </a:uFill>
-                <a:latin typeface="Arial"/>
+              <a:rPr lang="ro-RO" sz="1600" b="1" spc="-1" dirty="0">
+                <a:solidFill>
+                  <a:srgbClr val="000000"/>
+                </a:solidFill>
+                <a:uFill>
+                  <a:solidFill>
+                    <a:srgbClr val="FFFFFF"/>
+                  </a:solidFill>
+                </a:uFill>
+                <a:latin typeface="Arial" panose="020B0604020202020204" pitchFamily="34" charset="0"/>
+                <a:cs typeface="Arial" panose="020B0604020202020204" pitchFamily="34" charset="0"/>
               </a:rPr>
               <a:t>href</a:t>
             </a:r>
             <a:r>
-              <a:rPr lang="ro-RO" sz="1600" spc="-1" dirty="0" smtClean="0">
-                <a:solidFill>
-                  <a:srgbClr val="000000"/>
-                </a:solidFill>
-                <a:uFill>
-                  <a:solidFill>
-                    <a:srgbClr val="FFFFFF"/>
-                  </a:solidFill>
-                </a:uFill>
-                <a:latin typeface="Arial"/>
+              <a:rPr lang="ro-RO" sz="1600" spc="-1" dirty="0">
+                <a:solidFill>
+                  <a:srgbClr val="000000"/>
+                </a:solidFill>
+                <a:uFill>
+                  <a:solidFill>
+                    <a:srgbClr val="FFFFFF"/>
+                  </a:solidFill>
+                </a:uFill>
+                <a:latin typeface="Arial" panose="020B0604020202020204" pitchFamily="34" charset="0"/>
+                <a:cs typeface="Arial" panose="020B0604020202020204" pitchFamily="34" charset="0"/>
               </a:rPr>
               <a:t> și </a:t>
             </a:r>
             <a:r>
-              <a:rPr lang="ro-RO" sz="1600" b="1" spc="-1" dirty="0" smtClean="0">
-                <a:solidFill>
-                  <a:srgbClr val="000000"/>
-                </a:solidFill>
-                <a:uFill>
-                  <a:solidFill>
-                    <a:srgbClr val="FFFFFF"/>
-                  </a:solidFill>
-                </a:uFill>
-                <a:latin typeface="Arial"/>
+              <a:rPr lang="ro-RO" sz="1600" b="1" spc="-1" dirty="0">
+                <a:solidFill>
+                  <a:srgbClr val="000000"/>
+                </a:solidFill>
+                <a:uFill>
+                  <a:solidFill>
+                    <a:srgbClr val="FFFFFF"/>
+                  </a:solidFill>
+                </a:uFill>
+                <a:latin typeface="Arial" panose="020B0604020202020204" pitchFamily="34" charset="0"/>
+                <a:cs typeface="Arial" panose="020B0604020202020204" pitchFamily="34" charset="0"/>
               </a:rPr>
               <a:t>src</a:t>
             </a:r>
             <a:r>
-              <a:rPr lang="ro-RO" sz="1600" spc="-1" dirty="0" smtClean="0">
-                <a:solidFill>
-                  <a:srgbClr val="000000"/>
-                </a:solidFill>
-                <a:uFill>
-                  <a:solidFill>
-                    <a:srgbClr val="FFFFFF"/>
-                  </a:solidFill>
-                </a:uFill>
-                <a:latin typeface="Arial"/>
+              <a:rPr lang="ro-RO" sz="1600" spc="-1" dirty="0">
+                <a:solidFill>
+                  <a:srgbClr val="000000"/>
+                </a:solidFill>
+                <a:uFill>
+                  <a:solidFill>
+                    <a:srgbClr val="FFFFFF"/>
+                  </a:solidFill>
+                </a:uFill>
+                <a:latin typeface="Arial" panose="020B0604020202020204" pitchFamily="34" charset="0"/>
+                <a:cs typeface="Arial" panose="020B0604020202020204" pitchFamily="34" charset="0"/>
               </a:rPr>
               <a:t>.</a:t>
             </a:r>
@@ -6210,16 +6501,17 @@
               <a:buChar char="•"/>
             </a:pPr>
             <a:r>
-              <a:rPr lang="ro-RO" sz="1600" spc="-1" dirty="0" smtClean="0">
-                <a:solidFill>
-                  <a:srgbClr val="000000"/>
-                </a:solidFill>
-                <a:uFill>
-                  <a:solidFill>
-                    <a:srgbClr val="FFFFFF"/>
-                  </a:solidFill>
-                </a:uFill>
-                <a:latin typeface="Arial"/>
+              <a:rPr lang="ro-RO" sz="1600" spc="-1" dirty="0">
+                <a:solidFill>
+                  <a:srgbClr val="000000"/>
+                </a:solidFill>
+                <a:uFill>
+                  <a:solidFill>
+                    <a:srgbClr val="FFFFFF"/>
+                  </a:solidFill>
+                </a:uFill>
+                <a:latin typeface="Arial" panose="020B0604020202020204" pitchFamily="34" charset="0"/>
+                <a:cs typeface="Arial" panose="020B0604020202020204" pitchFamily="34" charset="0"/>
               </a:rPr>
               <a:t>Să filtreze link-urile externe (să rămână pe domeniul țintă).</a:t>
             </a:r>
@@ -6236,16 +6528,17 @@
               <a:buChar char="•"/>
             </a:pPr>
             <a:r>
-              <a:rPr lang="ro-RO" sz="1600" spc="-1" dirty="0" smtClean="0">
-                <a:solidFill>
-                  <a:srgbClr val="000000"/>
-                </a:solidFill>
-                <a:uFill>
-                  <a:solidFill>
-                    <a:srgbClr val="FFFFFF"/>
-                  </a:solidFill>
-                </a:uFill>
-                <a:latin typeface="Arial"/>
+              <a:rPr lang="ro-RO" sz="1600" spc="-1" dirty="0">
+                <a:solidFill>
+                  <a:srgbClr val="000000"/>
+                </a:solidFill>
+                <a:uFill>
+                  <a:solidFill>
+                    <a:srgbClr val="FFFFFF"/>
+                  </a:solidFill>
+                </a:uFill>
+                <a:latin typeface="Arial" panose="020B0604020202020204" pitchFamily="34" charset="0"/>
+                <a:cs typeface="Arial" panose="020B0604020202020204" pitchFamily="34" charset="0"/>
               </a:rPr>
               <a:t>Să evite ciclurile (să nu descarce aceeași pagină de două ori).</a:t>
             </a:r>
@@ -6270,7 +6563,8 @@
                   <a:srgbClr val="FFFFFF"/>
                 </a:solidFill>
               </a:uFill>
-              <a:latin typeface="Arial"/>
+              <a:latin typeface="Arial" panose="020B0604020202020204" pitchFamily="34" charset="0"/>
+              <a:cs typeface="Arial" panose="020B0604020202020204" pitchFamily="34" charset="0"/>
             </a:endParaRPr>
           </a:p>
           <a:p>
@@ -6285,16 +6579,17 @@
               <a:buChar char="•"/>
             </a:pPr>
             <a:r>
-              <a:rPr lang="ro-RO" sz="2000" spc="-1" dirty="0" smtClean="0">
-                <a:solidFill>
-                  <a:srgbClr val="000000"/>
-                </a:solidFill>
-                <a:uFill>
-                  <a:solidFill>
-                    <a:srgbClr val="FFFFFF"/>
-                  </a:solidFill>
-                </a:uFill>
-                <a:latin typeface="Arial"/>
+              <a:rPr lang="ro-RO" sz="2000" spc="-1" dirty="0">
+                <a:solidFill>
+                  <a:srgbClr val="000000"/>
+                </a:solidFill>
+                <a:uFill>
+                  <a:solidFill>
+                    <a:srgbClr val="FFFFFF"/>
+                  </a:solidFill>
+                </a:uFill>
+                <a:latin typeface="Arial" panose="020B0604020202020204" pitchFamily="34" charset="0"/>
+                <a:cs typeface="Arial" panose="020B0604020202020204" pitchFamily="34" charset="0"/>
               </a:rPr>
               <a:t>Mediu de rulare</a:t>
             </a:r>
@@ -6311,16 +6606,17 @@
               <a:buChar char="•"/>
             </a:pPr>
             <a:r>
-              <a:rPr lang="ro-RO" sz="1600" spc="-1" dirty="0" smtClean="0">
-                <a:solidFill>
-                  <a:srgbClr val="000000"/>
-                </a:solidFill>
-                <a:uFill>
-                  <a:solidFill>
-                    <a:srgbClr val="FFFFFF"/>
-                  </a:solidFill>
-                </a:uFill>
-                <a:latin typeface="Arial"/>
+              <a:rPr lang="ro-RO" sz="1600" spc="-1" dirty="0">
+                <a:solidFill>
+                  <a:srgbClr val="000000"/>
+                </a:solidFill>
+                <a:uFill>
+                  <a:solidFill>
+                    <a:srgbClr val="FFFFFF"/>
+                  </a:solidFill>
+                </a:uFill>
+                <a:latin typeface="Arial" panose="020B0604020202020204" pitchFamily="34" charset="0"/>
+                <a:cs typeface="Arial" panose="020B0604020202020204" pitchFamily="34" charset="0"/>
               </a:rPr>
               <a:t>Sistem de operare: Ubuntu 24.04 LTS (Bash shell)</a:t>
             </a:r>
@@ -6337,184 +6633,197 @@
               <a:buChar char="•"/>
             </a:pPr>
             <a:r>
-              <a:rPr lang="ro-RO" sz="1600" spc="-1" dirty="0" smtClean="0">
-                <a:solidFill>
-                  <a:srgbClr val="000000"/>
-                </a:solidFill>
-                <a:uFill>
-                  <a:solidFill>
-                    <a:srgbClr val="FFFFFF"/>
-                  </a:solidFill>
-                </a:uFill>
-                <a:latin typeface="Arial"/>
+              <a:rPr lang="ro-RO" sz="1600" spc="-1" dirty="0">
+                <a:solidFill>
+                  <a:srgbClr val="000000"/>
+                </a:solidFill>
+                <a:uFill>
+                  <a:solidFill>
+                    <a:srgbClr val="FFFFFF"/>
+                  </a:solidFill>
+                </a:uFill>
+                <a:latin typeface="Arial" panose="020B0604020202020204" pitchFamily="34" charset="0"/>
+                <a:cs typeface="Arial" panose="020B0604020202020204" pitchFamily="34" charset="0"/>
               </a:rPr>
               <a:t>Dependențe: </a:t>
             </a:r>
             <a:r>
-              <a:rPr lang="ro-RO" sz="1600" b="1" spc="-1" dirty="0" smtClean="0">
-                <a:solidFill>
-                  <a:srgbClr val="000000"/>
-                </a:solidFill>
-                <a:uFill>
-                  <a:solidFill>
-                    <a:srgbClr val="FFFFFF"/>
-                  </a:solidFill>
-                </a:uFill>
-                <a:latin typeface="Arial"/>
+              <a:rPr lang="ro-RO" sz="1600" b="1" spc="-1" dirty="0">
+                <a:solidFill>
+                  <a:srgbClr val="000000"/>
+                </a:solidFill>
+                <a:uFill>
+                  <a:solidFill>
+                    <a:srgbClr val="FFFFFF"/>
+                  </a:solidFill>
+                </a:uFill>
+                <a:latin typeface="Arial" panose="020B0604020202020204" pitchFamily="34" charset="0"/>
+                <a:cs typeface="Arial" panose="020B0604020202020204" pitchFamily="34" charset="0"/>
               </a:rPr>
               <a:t>wget</a:t>
             </a:r>
             <a:r>
-              <a:rPr lang="ro-RO" sz="1600" spc="-1" dirty="0" smtClean="0">
-                <a:solidFill>
-                  <a:srgbClr val="000000"/>
-                </a:solidFill>
-                <a:uFill>
-                  <a:solidFill>
-                    <a:srgbClr val="FFFFFF"/>
-                  </a:solidFill>
-                </a:uFill>
-                <a:latin typeface="Arial"/>
+              <a:rPr lang="ro-RO" sz="1600" spc="-1" dirty="0">
+                <a:solidFill>
+                  <a:srgbClr val="000000"/>
+                </a:solidFill>
+                <a:uFill>
+                  <a:solidFill>
+                    <a:srgbClr val="FFFFFF"/>
+                  </a:solidFill>
+                </a:uFill>
+                <a:latin typeface="Arial" panose="020B0604020202020204" pitchFamily="34" charset="0"/>
+                <a:cs typeface="Arial" panose="020B0604020202020204" pitchFamily="34" charset="0"/>
               </a:rPr>
               <a:t>,</a:t>
             </a:r>
             <a:r>
-              <a:rPr lang="ro-RO" sz="1600" b="1" spc="-1" dirty="0" smtClean="0">
-                <a:solidFill>
-                  <a:srgbClr val="000000"/>
-                </a:solidFill>
-                <a:uFill>
-                  <a:solidFill>
-                    <a:srgbClr val="FFFFFF"/>
-                  </a:solidFill>
-                </a:uFill>
-                <a:latin typeface="Arial"/>
+              <a:rPr lang="ro-RO" sz="1600" b="1" spc="-1" dirty="0">
+                <a:solidFill>
+                  <a:srgbClr val="000000"/>
+                </a:solidFill>
+                <a:uFill>
+                  <a:solidFill>
+                    <a:srgbClr val="FFFFFF"/>
+                  </a:solidFill>
+                </a:uFill>
+                <a:latin typeface="Arial" panose="020B0604020202020204" pitchFamily="34" charset="0"/>
+                <a:cs typeface="Arial" panose="020B0604020202020204" pitchFamily="34" charset="0"/>
               </a:rPr>
               <a:t> grep</a:t>
             </a:r>
             <a:r>
-              <a:rPr lang="ro-RO" sz="1600" spc="-1" dirty="0" smtClean="0">
-                <a:solidFill>
-                  <a:srgbClr val="000000"/>
-                </a:solidFill>
-                <a:uFill>
-                  <a:solidFill>
-                    <a:srgbClr val="FFFFFF"/>
-                  </a:solidFill>
-                </a:uFill>
-                <a:latin typeface="Arial"/>
+              <a:rPr lang="ro-RO" sz="1600" spc="-1" dirty="0">
+                <a:solidFill>
+                  <a:srgbClr val="000000"/>
+                </a:solidFill>
+                <a:uFill>
+                  <a:solidFill>
+                    <a:srgbClr val="FFFFFF"/>
+                  </a:solidFill>
+                </a:uFill>
+                <a:latin typeface="Arial" panose="020B0604020202020204" pitchFamily="34" charset="0"/>
+                <a:cs typeface="Arial" panose="020B0604020202020204" pitchFamily="34" charset="0"/>
               </a:rPr>
               <a:t>,</a:t>
             </a:r>
             <a:r>
-              <a:rPr lang="ro-RO" sz="1600" b="1" spc="-1" dirty="0" smtClean="0">
-                <a:solidFill>
-                  <a:srgbClr val="000000"/>
-                </a:solidFill>
-                <a:uFill>
-                  <a:solidFill>
-                    <a:srgbClr val="FFFFFF"/>
-                  </a:solidFill>
-                </a:uFill>
-                <a:latin typeface="Arial"/>
+              <a:rPr lang="ro-RO" sz="1600" b="1" spc="-1" dirty="0">
+                <a:solidFill>
+                  <a:srgbClr val="000000"/>
+                </a:solidFill>
+                <a:uFill>
+                  <a:solidFill>
+                    <a:srgbClr val="FFFFFF"/>
+                  </a:solidFill>
+                </a:uFill>
+                <a:latin typeface="Arial" panose="020B0604020202020204" pitchFamily="34" charset="0"/>
+                <a:cs typeface="Arial" panose="020B0604020202020204" pitchFamily="34" charset="0"/>
               </a:rPr>
               <a:t> sed</a:t>
             </a:r>
             <a:r>
-              <a:rPr lang="ro-RO" sz="1600" spc="-1" dirty="0" smtClean="0">
-                <a:solidFill>
-                  <a:srgbClr val="000000"/>
-                </a:solidFill>
-                <a:uFill>
-                  <a:solidFill>
-                    <a:srgbClr val="FFFFFF"/>
-                  </a:solidFill>
-                </a:uFill>
-                <a:latin typeface="Arial"/>
+              <a:rPr lang="ro-RO" sz="1600" spc="-1" dirty="0">
+                <a:solidFill>
+                  <a:srgbClr val="000000"/>
+                </a:solidFill>
+                <a:uFill>
+                  <a:solidFill>
+                    <a:srgbClr val="FFFFFF"/>
+                  </a:solidFill>
+                </a:uFill>
+                <a:latin typeface="Arial" panose="020B0604020202020204" pitchFamily="34" charset="0"/>
+                <a:cs typeface="Arial" panose="020B0604020202020204" pitchFamily="34" charset="0"/>
               </a:rPr>
               <a:t>,</a:t>
             </a:r>
             <a:r>
-              <a:rPr lang="ro-RO" sz="1600" b="1" spc="-1" dirty="0" smtClean="0">
-                <a:solidFill>
-                  <a:srgbClr val="000000"/>
-                </a:solidFill>
-                <a:uFill>
-                  <a:solidFill>
-                    <a:srgbClr val="FFFFFF"/>
-                  </a:solidFill>
-                </a:uFill>
-                <a:latin typeface="Arial"/>
+              <a:rPr lang="ro-RO" sz="1600" b="1" spc="-1" dirty="0">
+                <a:solidFill>
+                  <a:srgbClr val="000000"/>
+                </a:solidFill>
+                <a:uFill>
+                  <a:solidFill>
+                    <a:srgbClr val="FFFFFF"/>
+                  </a:solidFill>
+                </a:uFill>
+                <a:latin typeface="Arial" panose="020B0604020202020204" pitchFamily="34" charset="0"/>
+                <a:cs typeface="Arial" panose="020B0604020202020204" pitchFamily="34" charset="0"/>
               </a:rPr>
               <a:t> cut</a:t>
             </a:r>
             <a:r>
-              <a:rPr lang="ro-RO" sz="1600" spc="-1" dirty="0" smtClean="0">
-                <a:solidFill>
-                  <a:srgbClr val="000000"/>
-                </a:solidFill>
-                <a:uFill>
-                  <a:solidFill>
-                    <a:srgbClr val="FFFFFF"/>
-                  </a:solidFill>
-                </a:uFill>
-                <a:latin typeface="Arial"/>
+              <a:rPr lang="ro-RO" sz="1600" spc="-1" dirty="0">
+                <a:solidFill>
+                  <a:srgbClr val="000000"/>
+                </a:solidFill>
+                <a:uFill>
+                  <a:solidFill>
+                    <a:srgbClr val="FFFFFF"/>
+                  </a:solidFill>
+                </a:uFill>
+                <a:latin typeface="Arial" panose="020B0604020202020204" pitchFamily="34" charset="0"/>
+                <a:cs typeface="Arial" panose="020B0604020202020204" pitchFamily="34" charset="0"/>
               </a:rPr>
               <a:t>,</a:t>
             </a:r>
             <a:r>
-              <a:rPr lang="ro-RO" sz="1600" b="1" spc="-1" dirty="0" smtClean="0">
-                <a:solidFill>
-                  <a:srgbClr val="000000"/>
-                </a:solidFill>
-                <a:uFill>
-                  <a:solidFill>
-                    <a:srgbClr val="FFFFFF"/>
-                  </a:solidFill>
-                </a:uFill>
-                <a:latin typeface="Arial"/>
+              <a:rPr lang="ro-RO" sz="1600" b="1" spc="-1" dirty="0">
+                <a:solidFill>
+                  <a:srgbClr val="000000"/>
+                </a:solidFill>
+                <a:uFill>
+                  <a:solidFill>
+                    <a:srgbClr val="FFFFFF"/>
+                  </a:solidFill>
+                </a:uFill>
+                <a:latin typeface="Arial" panose="020B0604020202020204" pitchFamily="34" charset="0"/>
+                <a:cs typeface="Arial" panose="020B0604020202020204" pitchFamily="34" charset="0"/>
               </a:rPr>
               <a:t> basename</a:t>
             </a:r>
             <a:r>
-              <a:rPr lang="ro-RO" sz="1600" spc="-1" dirty="0" smtClean="0">
-                <a:solidFill>
-                  <a:srgbClr val="000000"/>
-                </a:solidFill>
-                <a:uFill>
-                  <a:solidFill>
-                    <a:srgbClr val="FFFFFF"/>
-                  </a:solidFill>
-                </a:uFill>
-                <a:latin typeface="Arial"/>
+              <a:rPr lang="ro-RO" sz="1600" spc="-1" dirty="0">
+                <a:solidFill>
+                  <a:srgbClr val="000000"/>
+                </a:solidFill>
+                <a:uFill>
+                  <a:solidFill>
+                    <a:srgbClr val="FFFFFF"/>
+                  </a:solidFill>
+                </a:uFill>
+                <a:latin typeface="Arial" panose="020B0604020202020204" pitchFamily="34" charset="0"/>
+                <a:cs typeface="Arial" panose="020B0604020202020204" pitchFamily="34" charset="0"/>
               </a:rPr>
               <a:t>,</a:t>
             </a:r>
             <a:r>
-              <a:rPr lang="ro-RO" sz="1600" b="1" spc="-1" dirty="0" smtClean="0">
-                <a:solidFill>
-                  <a:srgbClr val="000000"/>
-                </a:solidFill>
-                <a:uFill>
-                  <a:solidFill>
-                    <a:srgbClr val="FFFFFF"/>
-                  </a:solidFill>
-                </a:uFill>
-                <a:latin typeface="Arial"/>
-              </a:rPr>
-              <a:t> sort</a:t>
-            </a:r>
-            <a:r>
-              <a:rPr lang="ro-RO" sz="1600" spc="-1" dirty="0" smtClean="0">
-                <a:solidFill>
-                  <a:srgbClr val="000000"/>
-                </a:solidFill>
-                <a:uFill>
-                  <a:solidFill>
-                    <a:srgbClr val="FFFFFF"/>
-                  </a:solidFill>
-                </a:uFill>
-                <a:latin typeface="Arial"/>
+              <a:rPr lang="ro-RO" sz="1600" b="1" spc="-1" dirty="0">
+                <a:solidFill>
+                  <a:srgbClr val="000000"/>
+                </a:solidFill>
+                <a:uFill>
+                  <a:solidFill>
+                    <a:srgbClr val="FFFFFF"/>
+                  </a:solidFill>
+                </a:uFill>
+                <a:latin typeface="Arial" panose="020B0604020202020204" pitchFamily="34" charset="0"/>
+                <a:cs typeface="Arial" panose="020B0604020202020204" pitchFamily="34" charset="0"/>
+              </a:rPr>
+              <a:t> sort, xargs</a:t>
+            </a:r>
+            <a:r>
+              <a:rPr lang="ro-RO" sz="1600" spc="-1" dirty="0">
+                <a:solidFill>
+                  <a:srgbClr val="000000"/>
+                </a:solidFill>
+                <a:uFill>
+                  <a:solidFill>
+                    <a:srgbClr val="FFFFFF"/>
+                  </a:solidFill>
+                </a:uFill>
+                <a:latin typeface="Arial" panose="020B0604020202020204" pitchFamily="34" charset="0"/>
+                <a:cs typeface="Arial" panose="020B0604020202020204" pitchFamily="34" charset="0"/>
               </a:rPr>
               <a:t>.</a:t>
             </a:r>
@@ -6539,7 +6848,8 @@
                   <a:srgbClr val="FFFFFF"/>
                 </a:solidFill>
               </a:uFill>
-              <a:latin typeface="Arial"/>
+              <a:latin typeface="Arial" panose="020B0604020202020204" pitchFamily="34" charset="0"/>
+              <a:cs typeface="Arial" panose="020B0604020202020204" pitchFamily="34" charset="0"/>
             </a:endParaRPr>
           </a:p>
           <a:p>
@@ -6554,16 +6864,17 @@
               <a:buChar char="•"/>
             </a:pPr>
             <a:r>
-              <a:rPr lang="ro-RO" sz="2000" spc="-1" dirty="0" smtClean="0">
-                <a:solidFill>
-                  <a:srgbClr val="000000"/>
-                </a:solidFill>
-                <a:uFill>
-                  <a:solidFill>
-                    <a:srgbClr val="FFFFFF"/>
-                  </a:solidFill>
-                </a:uFill>
-                <a:latin typeface="Arial"/>
+              <a:rPr lang="ro-RO" sz="2000" spc="-1" dirty="0">
+                <a:solidFill>
+                  <a:srgbClr val="000000"/>
+                </a:solidFill>
+                <a:uFill>
+                  <a:solidFill>
+                    <a:srgbClr val="FFFFFF"/>
+                  </a:solidFill>
+                </a:uFill>
+                <a:latin typeface="Arial" panose="020B0604020202020204" pitchFamily="34" charset="0"/>
+                <a:cs typeface="Arial" panose="020B0604020202020204" pitchFamily="34" charset="0"/>
               </a:rPr>
               <a:t>Constrângeri</a:t>
             </a:r>
@@ -6580,72 +6891,77 @@
               <a:buChar char="•"/>
             </a:pPr>
             <a:r>
-              <a:rPr lang="ro-RO" sz="1600" spc="-1" dirty="0" smtClean="0">
-                <a:solidFill>
-                  <a:srgbClr val="000000"/>
-                </a:solidFill>
-                <a:uFill>
-                  <a:solidFill>
-                    <a:srgbClr val="FFFFFF"/>
-                  </a:solidFill>
-                </a:uFill>
-                <a:latin typeface="Arial"/>
+              <a:rPr lang="ro-RO" sz="1600" spc="-1" dirty="0">
+                <a:solidFill>
+                  <a:srgbClr val="000000"/>
+                </a:solidFill>
+                <a:uFill>
+                  <a:solidFill>
+                    <a:srgbClr val="FFFFFF"/>
+                  </a:solidFill>
+                </a:uFill>
+                <a:latin typeface="Arial" panose="020B0604020202020204" pitchFamily="34" charset="0"/>
+                <a:cs typeface="Arial" panose="020B0604020202020204" pitchFamily="34" charset="0"/>
               </a:rPr>
               <a:t>Interzisă folosirea flag-ului </a:t>
             </a:r>
             <a:r>
-              <a:rPr lang="ro-RO" sz="1600" b="1" spc="-1" dirty="0" smtClean="0">
-                <a:solidFill>
-                  <a:srgbClr val="000000"/>
-                </a:solidFill>
-                <a:uFill>
-                  <a:solidFill>
-                    <a:srgbClr val="FFFFFF"/>
-                  </a:solidFill>
-                </a:uFill>
-                <a:latin typeface="Arial"/>
+              <a:rPr lang="ro-RO" sz="1600" b="1" spc="-1" dirty="0">
+                <a:solidFill>
+                  <a:srgbClr val="000000"/>
+                </a:solidFill>
+                <a:uFill>
+                  <a:solidFill>
+                    <a:srgbClr val="FFFFFF"/>
+                  </a:solidFill>
+                </a:uFill>
+                <a:latin typeface="Arial" panose="020B0604020202020204" pitchFamily="34" charset="0"/>
+                <a:cs typeface="Arial" panose="020B0604020202020204" pitchFamily="34" charset="0"/>
               </a:rPr>
               <a:t>–r</a:t>
             </a:r>
             <a:r>
-              <a:rPr lang="ro-RO" sz="1600" spc="-1" dirty="0" smtClean="0">
-                <a:solidFill>
-                  <a:srgbClr val="000000"/>
-                </a:solidFill>
-                <a:uFill>
-                  <a:solidFill>
-                    <a:srgbClr val="FFFFFF"/>
-                  </a:solidFill>
-                </a:uFill>
-                <a:latin typeface="Arial"/>
+              <a:rPr lang="ro-RO" sz="1600" spc="-1" dirty="0">
+                <a:solidFill>
+                  <a:srgbClr val="000000"/>
+                </a:solidFill>
+                <a:uFill>
+                  <a:solidFill>
+                    <a:srgbClr val="FFFFFF"/>
+                  </a:solidFill>
+                </a:uFill>
+                <a:latin typeface="Arial" panose="020B0604020202020204" pitchFamily="34" charset="0"/>
+                <a:cs typeface="Arial" panose="020B0604020202020204" pitchFamily="34" charset="0"/>
               </a:rPr>
               <a:t> al comenzii </a:t>
             </a:r>
             <a:r>
-              <a:rPr lang="ro-RO" sz="1600" b="1" spc="-1" dirty="0" smtClean="0">
-                <a:solidFill>
-                  <a:srgbClr val="000000"/>
-                </a:solidFill>
-                <a:uFill>
-                  <a:solidFill>
-                    <a:srgbClr val="FFFFFF"/>
-                  </a:solidFill>
-                </a:uFill>
-                <a:latin typeface="Arial"/>
+              <a:rPr lang="ro-RO" sz="1600" b="1" spc="-1" dirty="0">
+                <a:solidFill>
+                  <a:srgbClr val="000000"/>
+                </a:solidFill>
+                <a:uFill>
+                  <a:solidFill>
+                    <a:srgbClr val="FFFFFF"/>
+                  </a:solidFill>
+                </a:uFill>
+                <a:latin typeface="Arial" panose="020B0604020202020204" pitchFamily="34" charset="0"/>
+                <a:cs typeface="Arial" panose="020B0604020202020204" pitchFamily="34" charset="0"/>
               </a:rPr>
               <a:t>wget</a:t>
             </a:r>
             <a:r>
-              <a:rPr lang="ro-RO" sz="1600" spc="-1" dirty="0" smtClean="0">
-                <a:solidFill>
-                  <a:srgbClr val="000000"/>
-                </a:solidFill>
-                <a:uFill>
-                  <a:solidFill>
-                    <a:srgbClr val="FFFFFF"/>
-                  </a:solidFill>
-                </a:uFill>
-                <a:latin typeface="Arial"/>
+              <a:rPr lang="ro-RO" sz="1600" spc="-1" dirty="0">
+                <a:solidFill>
+                  <a:srgbClr val="000000"/>
+                </a:solidFill>
+                <a:uFill>
+                  <a:solidFill>
+                    <a:srgbClr val="FFFFFF"/>
+                  </a:solidFill>
+                </a:uFill>
+                <a:latin typeface="Arial" panose="020B0604020202020204" pitchFamily="34" charset="0"/>
+                <a:cs typeface="Arial" panose="020B0604020202020204" pitchFamily="34" charset="0"/>
               </a:rPr>
               <a:t>.</a:t>
             </a:r>
@@ -6745,7 +7061,7 @@
               </a:lnSpc>
             </a:pPr>
             <a:r>
-              <a:rPr lang="en-US" sz="4400" b="0" strike="noStrike" spc="-1">
+              <a:rPr lang="en-US" sz="4400" b="0" strike="noStrike" spc="-1" dirty="0">
                 <a:solidFill>
                   <a:srgbClr val="000000"/>
                 </a:solidFill>
@@ -6759,7 +7075,7 @@
               </a:rPr>
               <a:t>Design</a:t>
             </a:r>
-            <a:endParaRPr lang="en-US" sz="1800" b="0" strike="noStrike" spc="-1">
+            <a:endParaRPr lang="en-US" sz="1800" b="0" strike="noStrike" spc="-1" dirty="0">
               <a:solidFill>
                 <a:srgbClr val="000000"/>
               </a:solidFill>
@@ -6819,7 +7135,7 @@
               <a:buChar char="•"/>
             </a:pPr>
             <a:r>
-              <a:rPr lang="ro-RO" sz="2000" b="0" strike="noStrike" spc="-1" dirty="0" smtClean="0">
+              <a:rPr lang="ro-RO" sz="2000" b="0" strike="noStrike" spc="-1" dirty="0">
                 <a:solidFill>
                   <a:srgbClr val="000000"/>
                 </a:solidFill>
@@ -6845,7 +7161,7 @@
               <a:buChar char="•"/>
             </a:pPr>
             <a:r>
-              <a:rPr lang="ro-RO" sz="1600" b="0" strike="noStrike" spc="-1" dirty="0" smtClean="0">
+              <a:rPr lang="ro-RO" sz="1600" b="0" strike="noStrike" spc="-1" dirty="0">
                 <a:solidFill>
                   <a:srgbClr val="000000"/>
                 </a:solidFill>
@@ -6859,7 +7175,7 @@
               <a:t>Modelul este inspirat de </a:t>
             </a:r>
             <a:r>
-              <a:rPr lang="ro-RO" sz="1600" b="1" strike="noStrike" spc="-1" dirty="0" smtClean="0">
+              <a:rPr lang="ro-RO" sz="1600" b="1" strike="noStrike" spc="-1" dirty="0">
                 <a:solidFill>
                   <a:srgbClr val="000000"/>
                 </a:solidFill>
@@ -6873,7 +7189,7 @@
               <a:t>Breadth-First Search</a:t>
             </a:r>
             <a:r>
-              <a:rPr lang="ro-RO" sz="1600" spc="-1" dirty="0" smtClean="0">
+              <a:rPr lang="ro-RO" sz="1600" spc="-1" dirty="0">
                 <a:solidFill>
                   <a:srgbClr val="000000"/>
                 </a:solidFill>
@@ -6899,7 +7215,7 @@
               <a:buChar char="•"/>
             </a:pPr>
             <a:r>
-              <a:rPr lang="ro-RO" sz="1600" b="1" strike="noStrike" spc="-1" dirty="0" smtClean="0">
+              <a:rPr lang="ro-RO" sz="1600" b="1" strike="noStrike" spc="-1" dirty="0">
                 <a:solidFill>
                   <a:srgbClr val="000000"/>
                 </a:solidFill>
@@ -6925,7 +7241,7 @@
               <a:buAutoNum type="arabicPeriod"/>
             </a:pPr>
             <a:r>
-              <a:rPr lang="ro-RO" sz="1600" b="1" spc="-1" dirty="0" smtClean="0">
+              <a:rPr lang="ro-RO" sz="1600" b="1" spc="-1" dirty="0">
                 <a:solidFill>
                   <a:srgbClr val="000000"/>
                 </a:solidFill>
@@ -6939,7 +7255,7 @@
               <a:t>Downloader: wget</a:t>
             </a:r>
             <a:r>
-              <a:rPr lang="ro-RO" sz="1600" spc="-1" dirty="0" smtClean="0">
+              <a:rPr lang="ro-RO" sz="1600" spc="-1" dirty="0">
                 <a:solidFill>
                   <a:srgbClr val="000000"/>
                 </a:solidFill>
@@ -6965,7 +7281,7 @@
               <a:buAutoNum type="arabicPeriod"/>
             </a:pPr>
             <a:r>
-              <a:rPr lang="ro-RO" sz="1600" b="1" spc="-1" dirty="0" smtClean="0">
+              <a:rPr lang="ro-RO" sz="1600" b="1" spc="-1" dirty="0">
                 <a:solidFill>
                   <a:srgbClr val="000000"/>
                 </a:solidFill>
@@ -6979,7 +7295,7 @@
               <a:t>Parser</a:t>
             </a:r>
             <a:r>
-              <a:rPr lang="ro-RO" sz="1600" spc="-1" dirty="0" smtClean="0">
+              <a:rPr lang="ro-RO" sz="1600" spc="-1" dirty="0">
                 <a:solidFill>
                   <a:srgbClr val="000000"/>
                 </a:solidFill>
@@ -7005,7 +7321,7 @@
               <a:buAutoNum type="arabicPeriod"/>
             </a:pPr>
             <a:r>
-              <a:rPr lang="ro-RO" sz="1600" b="1" spc="-1" dirty="0" smtClean="0">
+              <a:rPr lang="ro-RO" sz="1600" b="1" spc="-1" dirty="0">
                 <a:solidFill>
                   <a:srgbClr val="000000"/>
                 </a:solidFill>
@@ -7019,7 +7335,7 @@
               <a:t>Scheduler</a:t>
             </a:r>
             <a:r>
-              <a:rPr lang="ro-RO" sz="1600" spc="-1" dirty="0" smtClean="0">
+              <a:rPr lang="ro-RO" sz="1600" spc="-1" dirty="0">
                 <a:solidFill>
                   <a:srgbClr val="000000"/>
                 </a:solidFill>
@@ -7033,7 +7349,7 @@
               <a:t>: Gestionează fișierele </a:t>
             </a:r>
             <a:r>
-              <a:rPr lang="ro-RO" sz="1600" b="1" spc="-1" dirty="0" smtClean="0">
+              <a:rPr lang="ro-RO" sz="1600" b="1" spc="-1" dirty="0">
                 <a:solidFill>
                   <a:srgbClr val="000000"/>
                 </a:solidFill>
@@ -7047,35 +7363,49 @@
               <a:t>promises.txt </a:t>
             </a:r>
             <a:r>
-              <a:rPr lang="ro-RO" sz="1600" spc="-1" dirty="0" smtClean="0">
-                <a:solidFill>
-                  <a:srgbClr val="000000"/>
-                </a:solidFill>
-                <a:uFill>
-                  <a:solidFill>
-                    <a:srgbClr val="FFFFFF"/>
-                  </a:solidFill>
-                </a:uFill>
-                <a:latin typeface="Arial"/>
-              </a:rPr>
-              <a:t>(coada curentă) și </a:t>
-            </a:r>
-            <a:r>
-              <a:rPr lang="ro-RO" sz="1600" b="1" spc="-1" dirty="0" smtClean="0">
-                <a:solidFill>
-                  <a:srgbClr val="000000"/>
-                </a:solidFill>
-                <a:uFill>
-                  <a:solidFill>
-                    <a:srgbClr val="FFFFFF"/>
-                  </a:solidFill>
-                </a:uFill>
-                <a:latin typeface="Arial"/>
-              </a:rPr>
-              <a:t>visited.txt </a:t>
-            </a:r>
-            <a:r>
-              <a:rPr lang="ro-RO" sz="1600" spc="-1" dirty="0" smtClean="0">
+              <a:rPr lang="ro-RO" sz="1600" spc="-1" dirty="0">
+                <a:solidFill>
+                  <a:srgbClr val="000000"/>
+                </a:solidFill>
+                <a:uFill>
+                  <a:solidFill>
+                    <a:srgbClr val="FFFFFF"/>
+                  </a:solidFill>
+                </a:uFill>
+                <a:latin typeface="Arial"/>
+              </a:rPr>
+              <a:t>(coada curentă), </a:t>
+            </a:r>
+            <a:r>
+              <a:rPr lang="ro-RO" sz="1600" b="1" spc="-1" dirty="0" err="1">
+                <a:solidFill>
+                  <a:srgbClr val="000000"/>
+                </a:solidFill>
+                <a:uFill>
+                  <a:solidFill>
+                    <a:srgbClr val="FFFFFF"/>
+                  </a:solidFill>
+                </a:uFill>
+                <a:latin typeface="Arial"/>
+              </a:rPr>
+              <a:t>visited.txt</a:t>
+            </a:r>
+            <a:r>
+              <a:rPr lang="ro-RO" sz="1600" b="1" spc="-1" dirty="0">
+                <a:solidFill>
+                  <a:srgbClr val="000000"/>
+                </a:solidFill>
+                <a:uFill>
+                  <a:solidFill>
+                    <a:srgbClr val="FFFFFF"/>
+                  </a:solidFill>
+                </a:uFill>
+                <a:latin typeface="Arial"/>
+              </a:rPr>
+              <a:t> </a:t>
+            </a:r>
+            <a:r>
+              <a:rPr lang="ro-RO" sz="1600" spc="-1" dirty="0">
                 <a:solidFill>
                   <a:srgbClr val="000000"/>
                 </a:solidFill>
@@ -7124,7 +7454,7 @@
               <a:buChar char="•"/>
             </a:pPr>
             <a:r>
-              <a:rPr lang="ro-RO" sz="2000" spc="-1" dirty="0" smtClean="0">
+              <a:rPr lang="ro-RO" sz="2000" spc="-1" dirty="0">
                 <a:solidFill>
                   <a:srgbClr val="000000"/>
                 </a:solidFill>
@@ -7150,7 +7480,7 @@
               <a:buAutoNum type="arabicPeriod"/>
             </a:pPr>
             <a:r>
-              <a:rPr lang="ro-RO" sz="1600" spc="-1" dirty="0" smtClean="0">
+              <a:rPr lang="ro-RO" sz="1600" spc="-1" dirty="0">
                 <a:solidFill>
                   <a:srgbClr val="000000"/>
                 </a:solidFill>
@@ -7164,7 +7494,7 @@
               <a:t>Verificare promisiuni: Dacă există </a:t>
             </a:r>
             <a:r>
-              <a:rPr lang="ro-RO" sz="1600" b="1" spc="-1" dirty="0" smtClean="0">
+              <a:rPr lang="ro-RO" sz="1600" b="1" spc="-1" dirty="0">
                 <a:solidFill>
                   <a:srgbClr val="000000"/>
                 </a:solidFill>
@@ -7178,7 +7508,7 @@
               <a:t>promises.txt</a:t>
             </a:r>
             <a:r>
-              <a:rPr lang="ro-RO" sz="1600" spc="-1" dirty="0" smtClean="0">
+              <a:rPr lang="ro-RO" sz="1600" spc="-1" dirty="0">
                 <a:solidFill>
                   <a:srgbClr val="000000"/>
                 </a:solidFill>
@@ -7204,7 +7534,7 @@
               <a:buAutoNum type="arabicPeriod"/>
             </a:pPr>
             <a:r>
-              <a:rPr lang="ro-RO" sz="1600" spc="-1" dirty="0" smtClean="0">
+              <a:rPr lang="ro-RO" sz="1600" spc="-1" dirty="0">
                 <a:solidFill>
                   <a:srgbClr val="000000"/>
                 </a:solidFill>
@@ -7230,7 +7560,7 @@
               <a:buChar char="•"/>
             </a:pPr>
             <a:r>
-              <a:rPr lang="ro-RO" sz="1600" spc="-1" dirty="0" smtClean="0">
+              <a:rPr lang="ro-RO" sz="1600" spc="-1" dirty="0">
                 <a:solidFill>
                   <a:srgbClr val="000000"/>
                 </a:solidFill>
@@ -7256,7 +7586,7 @@
               <a:buChar char="•"/>
             </a:pPr>
             <a:r>
-              <a:rPr lang="ro-RO" sz="1600" spc="-1" dirty="0" smtClean="0">
+              <a:rPr lang="ro-RO" sz="1600" spc="-1" dirty="0">
                 <a:solidFill>
                   <a:srgbClr val="000000"/>
                 </a:solidFill>
@@ -7282,7 +7612,7 @@
               <a:buChar char="•"/>
             </a:pPr>
             <a:r>
-              <a:rPr lang="ro-RO" sz="1600" spc="-1" dirty="0" smtClean="0">
+              <a:rPr lang="ro-RO" sz="1600" spc="-1" dirty="0">
                 <a:solidFill>
                   <a:srgbClr val="000000"/>
                 </a:solidFill>
@@ -7308,7 +7638,7 @@
               <a:buChar char="•"/>
             </a:pPr>
             <a:r>
-              <a:rPr lang="ro-RO" sz="1600" spc="-1" dirty="0" smtClean="0">
+              <a:rPr lang="ro-RO" sz="1600" spc="-1" dirty="0">
                 <a:solidFill>
                   <a:srgbClr val="000000"/>
                 </a:solidFill>
@@ -7334,7 +7664,7 @@
               <a:buChar char="•"/>
             </a:pPr>
             <a:r>
-              <a:rPr lang="ro-RO" sz="1600" spc="-1" dirty="0" smtClean="0">
+              <a:rPr lang="ro-RO" sz="1600" spc="-1" dirty="0">
                 <a:solidFill>
                   <a:srgbClr val="000000"/>
                 </a:solidFill>
@@ -7348,7 +7678,7 @@
               <a:t>Adaugă link-urile în </a:t>
             </a:r>
             <a:r>
-              <a:rPr lang="ro-RO" sz="1600" b="1" spc="-1" dirty="0" smtClean="0">
+              <a:rPr lang="ro-RO" sz="1600" b="1" spc="-1" dirty="0">
                 <a:solidFill>
                   <a:srgbClr val="000000"/>
                 </a:solidFill>
@@ -7397,7 +7727,7 @@
               <a:buChar char="•"/>
             </a:pPr>
             <a:r>
-              <a:rPr lang="ro-RO" sz="2000" spc="-1" dirty="0" smtClean="0">
+              <a:rPr lang="ro-RO" sz="2000" spc="-1" dirty="0">
                 <a:solidFill>
                   <a:srgbClr val="000000"/>
                 </a:solidFill>
@@ -7423,44 +7753,19 @@
               <a:buChar char="•"/>
             </a:pPr>
             <a:r>
-              <a:rPr lang="ro-RO" sz="1600" spc="-1" dirty="0" smtClean="0">
-                <a:solidFill>
-                  <a:srgbClr val="000000"/>
-                </a:solidFill>
-                <a:uFill>
-                  <a:solidFill>
-                    <a:srgbClr val="FFFFFF"/>
-                  </a:solidFill>
-                </a:uFill>
-                <a:latin typeface="Arial"/>
-              </a:rPr>
-              <a:t>Stocarea cozii în fișiere text permite oprirea și reluarea procesului, spre deosebire de o coadă </a:t>
-            </a:r>
-            <a:r>
-              <a:rPr lang="ro-RO" sz="1600" spc="-1" smtClean="0">
-                <a:solidFill>
-                  <a:srgbClr val="000000"/>
-                </a:solidFill>
-                <a:uFill>
-                  <a:solidFill>
-                    <a:srgbClr val="FFFFFF"/>
-                  </a:solidFill>
-                </a:uFill>
-                <a:latin typeface="Arial"/>
-              </a:rPr>
-              <a:t>în memoria RAM care s-ar pierde la terminarea scriptului.</a:t>
-            </a:r>
-            <a:endParaRPr lang="ro-RO" sz="1600" spc="-1" dirty="0">
-              <a:solidFill>
-                <a:srgbClr val="000000"/>
-              </a:solidFill>
-              <a:uFill>
-                <a:solidFill>
-                  <a:srgbClr val="FFFFFF"/>
-                </a:solidFill>
-              </a:uFill>
-              <a:latin typeface="Arial"/>
-            </a:endParaRPr>
+              <a:rPr lang="ro-RO" sz="1600" spc="-1" dirty="0">
+                <a:solidFill>
+                  <a:srgbClr val="000000"/>
+                </a:solidFill>
+                <a:uFill>
+                  <a:solidFill>
+                    <a:srgbClr val="FFFFFF"/>
+                  </a:solidFill>
+                </a:uFill>
+                <a:latin typeface="Arial"/>
+              </a:rPr>
+              <a:t>Stocarea cozii în fișiere text permite oprirea și reluarea procesului, spre deosebire de o coadă în memoria RAM care s-ar pierde la terminarea scriptului.</a:t>
+            </a:r>
           </a:p>
         </p:txBody>
       </p:sp>
@@ -7631,7 +7936,7 @@
               <a:buChar char="•"/>
             </a:pPr>
             <a:r>
-              <a:rPr lang="en-US" sz="2000" b="0" strike="noStrike" spc="-1" dirty="0" err="1" smtClean="0">
+              <a:rPr lang="en-US" sz="2000" b="0" strike="noStrike" spc="-1" dirty="0">
                 <a:solidFill>
                   <a:srgbClr val="000000"/>
                 </a:solidFill>
@@ -7645,7 +7950,7 @@
               <a:t>Limbaj</a:t>
             </a:r>
             <a:r>
-              <a:rPr lang="ro-RO" sz="2000" b="0" strike="noStrike" spc="-1" dirty="0" smtClean="0">
+              <a:rPr lang="ro-RO" sz="2000" b="0" strike="noStrike" spc="-1" dirty="0">
                 <a:solidFill>
                   <a:srgbClr val="000000"/>
                 </a:solidFill>
@@ -7682,7 +7987,7 @@
               <a:buChar char="•"/>
             </a:pPr>
             <a:r>
-              <a:rPr lang="ro-RO" sz="1600" b="0" strike="noStrike" spc="-1" dirty="0" smtClean="0">
+              <a:rPr lang="ro-RO" sz="1600" b="0" strike="noStrike" spc="-1" dirty="0">
                 <a:solidFill>
                   <a:srgbClr val="000000"/>
                 </a:solidFill>
@@ -7696,7 +8001,7 @@
               <a:t>Bash Scripting: Pentru logica de control (</a:t>
             </a:r>
             <a:r>
-              <a:rPr lang="ro-RO" sz="1600" b="1" strike="noStrike" spc="-1" dirty="0" smtClean="0">
+              <a:rPr lang="ro-RO" sz="1600" b="1" strike="noStrike" spc="-1" dirty="0">
                 <a:solidFill>
                   <a:srgbClr val="000000"/>
                 </a:solidFill>
@@ -7710,7 +8015,7 @@
               <a:t>if</a:t>
             </a:r>
             <a:r>
-              <a:rPr lang="ro-RO" sz="1600" b="0" strike="noStrike" spc="-1" dirty="0" smtClean="0">
+              <a:rPr lang="ro-RO" sz="1600" b="0" strike="noStrike" spc="-1" dirty="0">
                 <a:solidFill>
                   <a:srgbClr val="000000"/>
                 </a:solidFill>
@@ -7724,7 +8029,7 @@
               <a:t>, </a:t>
             </a:r>
             <a:r>
-              <a:rPr lang="ro-RO" sz="1600" b="1" strike="noStrike" spc="-1" dirty="0" smtClean="0">
+              <a:rPr lang="ro-RO" sz="1600" b="1" strike="noStrike" spc="-1" dirty="0">
                 <a:solidFill>
                   <a:srgbClr val="000000"/>
                 </a:solidFill>
@@ -7738,7 +8043,7 @@
               <a:t>while</a:t>
             </a:r>
             <a:r>
-              <a:rPr lang="ro-RO" sz="1600" b="0" strike="noStrike" spc="-1" dirty="0" smtClean="0">
+              <a:rPr lang="ro-RO" sz="1600" b="0" strike="noStrike" spc="-1" dirty="0">
                 <a:solidFill>
                   <a:srgbClr val="000000"/>
                 </a:solidFill>
@@ -7764,7 +8069,7 @@
               <a:buChar char="•"/>
             </a:pPr>
             <a:r>
-              <a:rPr lang="ro-RO" sz="1600" spc="-1" dirty="0" smtClean="0">
+              <a:rPr lang="ro-RO" sz="1600" spc="-1" dirty="0">
                 <a:solidFill>
                   <a:srgbClr val="000000"/>
                 </a:solidFill>
@@ -7778,7 +8083,7 @@
               <a:t>Parsare: </a:t>
             </a:r>
             <a:r>
-              <a:rPr lang="ro-RO" sz="1600" b="1" spc="-1" dirty="0" smtClean="0">
+              <a:rPr lang="ro-RO" sz="1600" b="1" spc="-1" dirty="0">
                 <a:solidFill>
                   <a:srgbClr val="000000"/>
                 </a:solidFill>
@@ -7792,7 +8097,7 @@
               <a:t>grep –ohiE ‘(href|src)=„[^”]”’</a:t>
             </a:r>
             <a:r>
-              <a:rPr lang="ro-RO" sz="1600" spc="-1" dirty="0" smtClean="0">
+              <a:rPr lang="ro-RO" sz="1600" spc="-1" dirty="0">
                 <a:solidFill>
                   <a:srgbClr val="000000"/>
                 </a:solidFill>
@@ -7818,7 +8123,7 @@
               <a:buChar char="•"/>
             </a:pPr>
             <a:r>
-              <a:rPr lang="ro-RO" sz="1600" b="0" strike="noStrike" spc="-1" dirty="0" smtClean="0">
+              <a:rPr lang="ro-RO" sz="1600" b="0" strike="noStrike" spc="-1" dirty="0">
                 <a:solidFill>
                   <a:srgbClr val="000000"/>
                 </a:solidFill>
@@ -7832,7 +8137,7 @@
               <a:t>Curățare date: </a:t>
             </a:r>
             <a:r>
-              <a:rPr lang="ro-RO" sz="1600" b="1" strike="noStrike" spc="-1" dirty="0" smtClean="0">
+              <a:rPr lang="ro-RO" sz="1600" b="1" strike="noStrike" spc="-1" dirty="0">
                 <a:solidFill>
                   <a:srgbClr val="000000"/>
                 </a:solidFill>
@@ -7846,7 +8151,7 @@
               <a:t>cut –d’”’</a:t>
             </a:r>
             <a:r>
-              <a:rPr lang="ro-RO" sz="1600" strike="noStrike" spc="-1" dirty="0" smtClean="0">
+              <a:rPr lang="ro-RO" sz="1600" strike="noStrike" spc="-1" dirty="0">
                 <a:solidFill>
                   <a:srgbClr val="000000"/>
                 </a:solidFill>
@@ -7860,7 +8165,7 @@
               <a:t> și </a:t>
             </a:r>
             <a:r>
-              <a:rPr lang="ro-RO" sz="1600" b="1" strike="noStrike" spc="-1" dirty="0" smtClean="0">
+              <a:rPr lang="ro-RO" sz="1600" b="1" strike="noStrike" spc="-1" dirty="0">
                 <a:solidFill>
                   <a:srgbClr val="000000"/>
                 </a:solidFill>
@@ -7874,35 +8179,21 @@
               <a:t>sed</a:t>
             </a:r>
             <a:r>
-              <a:rPr lang="ro-RO" sz="1600" strike="noStrike" spc="-1" dirty="0" smtClean="0">
-                <a:solidFill>
-                  <a:srgbClr val="000000"/>
-                </a:solidFill>
-                <a:uFill>
-                  <a:solidFill>
-                    <a:srgbClr val="FFFFFF"/>
-                  </a:solidFill>
-                </a:uFill>
-                <a:latin typeface="Arial"/>
-              </a:rPr>
-              <a:t> pentru a elimina </a:t>
-            </a:r>
-            <a:r>
-              <a:rPr lang="ro-RO" sz="1600" strike="noStrike" spc="-1" dirty="0" smtClean="0">
-                <a:solidFill>
-                  <a:srgbClr val="000000"/>
-                </a:solidFill>
-                <a:uFill>
-                  <a:solidFill>
-                    <a:srgbClr val="FFFFFF"/>
-                  </a:solidFill>
-                </a:uFill>
-                <a:latin typeface="Arial"/>
-              </a:rPr>
-              <a:t>g</a:t>
-            </a:r>
-            <a:r>
-              <a:rPr lang="en-US" sz="1600" strike="noStrike" spc="-1" dirty="0" err="1" smtClean="0">
+              <a:rPr lang="ro-RO" sz="1600" strike="noStrike" spc="-1" dirty="0">
+                <a:solidFill>
+                  <a:srgbClr val="000000"/>
+                </a:solidFill>
+                <a:uFill>
+                  <a:solidFill>
+                    <a:srgbClr val="FFFFFF"/>
+                  </a:solidFill>
+                </a:uFill>
+                <a:latin typeface="Arial"/>
+              </a:rPr>
+              <a:t> pentru a elimina g</a:t>
+            </a:r>
+            <a:r>
+              <a:rPr lang="en-US" sz="1600" strike="noStrike" spc="-1" dirty="0" err="1">
                 <a:solidFill>
                   <a:srgbClr val="000000"/>
                 </a:solidFill>
@@ -7916,7 +8207,7 @@
               <a:t>hilimelele</a:t>
             </a:r>
             <a:r>
-              <a:rPr lang="en-US" sz="1600" strike="noStrike" spc="-1" dirty="0" smtClean="0">
+              <a:rPr lang="en-US" sz="1600" strike="noStrike" spc="-1" dirty="0">
                 <a:solidFill>
                   <a:srgbClr val="000000"/>
                 </a:solidFill>
@@ -7930,7 +8221,7 @@
               <a:t> </a:t>
             </a:r>
             <a:r>
-              <a:rPr lang="ro-RO" sz="1600" strike="noStrike" spc="-1" dirty="0" smtClean="0">
+              <a:rPr lang="ro-RO" sz="1600" strike="noStrike" spc="-1" dirty="0">
                 <a:solidFill>
                   <a:srgbClr val="000000"/>
                 </a:solidFill>
@@ -7956,7 +8247,7 @@
               <a:buChar char="•"/>
             </a:pPr>
             <a:r>
-              <a:rPr lang="ro-RO" sz="1600" b="0" spc="-1" dirty="0" smtClean="0">
+              <a:rPr lang="ro-RO" sz="1600" b="0" spc="-1" dirty="0">
                 <a:solidFill>
                   <a:srgbClr val="000000"/>
                 </a:solidFill>
@@ -7970,7 +8261,7 @@
               <a:t>Deduplicare: </a:t>
             </a:r>
             <a:r>
-              <a:rPr lang="ro-RO" sz="1600" b="1" spc="-1" dirty="0" smtClean="0">
+              <a:rPr lang="ro-RO" sz="1600" b="1" spc="-1" dirty="0">
                 <a:solidFill>
                   <a:srgbClr val="000000"/>
                 </a:solidFill>
@@ -7984,7 +8275,7 @@
               <a:t>sort –u</a:t>
             </a:r>
             <a:r>
-              <a:rPr lang="ro-RO" sz="1600" spc="-1" dirty="0" smtClean="0">
+              <a:rPr lang="ro-RO" sz="1600" spc="-1" dirty="0">
                 <a:solidFill>
                   <a:srgbClr val="000000"/>
                 </a:solidFill>
@@ -7998,7 +8289,7 @@
               <a:t> pentru a asigura că </a:t>
             </a:r>
             <a:r>
-              <a:rPr lang="ro-RO" sz="1600" b="1" spc="-1" dirty="0" smtClean="0">
+              <a:rPr lang="ro-RO" sz="1600" b="1" spc="-1" dirty="0">
                 <a:solidFill>
                   <a:srgbClr val="000000"/>
                 </a:solidFill>
@@ -8012,7 +8303,7 @@
               <a:t>promises.txt</a:t>
             </a:r>
             <a:r>
-              <a:rPr lang="ro-RO" sz="1600" spc="-1" dirty="0" smtClean="0">
+              <a:rPr lang="ro-RO" sz="1600" spc="-1" dirty="0">
                 <a:solidFill>
                   <a:srgbClr val="000000"/>
                 </a:solidFill>
@@ -8037,7 +8328,7 @@
               <a:buFont typeface="Arial"/>
               <a:buChar char="•"/>
             </a:pPr>
-            <a:endParaRPr lang="ro-RO" sz="1600" b="0" strike="noStrike" spc="-1" dirty="0" smtClean="0">
+            <a:endParaRPr lang="ro-RO" sz="1600" b="0" strike="noStrike" spc="-1" dirty="0">
               <a:solidFill>
                 <a:srgbClr val="000000"/>
               </a:solidFill>
@@ -8061,18 +8352,18 @@
               <a:buChar char="•"/>
             </a:pPr>
             <a:r>
-              <a:rPr lang="ro-RO" sz="2000" b="0" strike="noStrike" spc="-1" dirty="0" smtClean="0">
-                <a:solidFill>
-                  <a:srgbClr val="000000"/>
-                </a:solidFill>
-                <a:uFill>
-                  <a:solidFill>
-                    <a:srgbClr val="FFFFFF"/>
-                  </a:solidFill>
-                </a:uFill>
-                <a:latin typeface="Arial"/>
-              </a:rPr>
-              <a:t>Probleme tehnice și soluțiiL</a:t>
+              <a:rPr lang="ro-RO" sz="2000" b="0" strike="noStrike" spc="-1" dirty="0">
+                <a:solidFill>
+                  <a:srgbClr val="000000"/>
+                </a:solidFill>
+                <a:uFill>
+                  <a:solidFill>
+                    <a:srgbClr val="FFFFFF"/>
+                  </a:solidFill>
+                </a:uFill>
+                <a:latin typeface="Arial"/>
+              </a:rPr>
+              <a:t>Probleme tehnice și soluțiile</a:t>
             </a:r>
           </a:p>
           <a:p>
@@ -8087,7 +8378,7 @@
               <a:buChar char="•"/>
             </a:pPr>
             <a:r>
-              <a:rPr lang="ro-RO" sz="1600" spc="-1" dirty="0" smtClean="0">
+              <a:rPr lang="ro-RO" sz="1600" spc="-1" dirty="0">
                 <a:solidFill>
                   <a:srgbClr val="000000"/>
                 </a:solidFill>
@@ -8113,21 +8404,49 @@
               <a:buChar char="•"/>
             </a:pPr>
             <a:r>
-              <a:rPr lang="ro-RO" sz="1600" b="0" strike="noStrike" spc="-1" dirty="0" smtClean="0">
-                <a:solidFill>
-                  <a:srgbClr val="000000"/>
-                </a:solidFill>
-                <a:uFill>
-                  <a:solidFill>
-                    <a:srgbClr val="FFFFFF"/>
-                  </a:solidFill>
-                </a:uFill>
-                <a:latin typeface="Arial"/>
-              </a:rPr>
-              <a:t>Gestionarea Redirect-urilor: S-a optat pentru prefixarea cu </a:t>
-            </a:r>
-            <a:r>
-              <a:rPr lang="ro-RO" sz="1600" b="1" strike="noStrike" spc="-1" dirty="0" smtClean="0">
+              <a:rPr lang="ro-RO" sz="1600" b="0" strike="noStrike" spc="-1" dirty="0">
+                <a:solidFill>
+                  <a:srgbClr val="000000"/>
+                </a:solidFill>
+                <a:uFill>
+                  <a:solidFill>
+                    <a:srgbClr val="FFFFFF"/>
+                  </a:solidFill>
+                </a:uFill>
+                <a:latin typeface="Arial"/>
+              </a:rPr>
+              <a:t>Gestionarea Redirect-urilor: S-a optat pentru prefixarea </a:t>
+            </a:r>
+            <a:r>
+              <a:rPr lang="ro-RO" sz="1600" spc="-1" dirty="0">
+                <a:solidFill>
+                  <a:srgbClr val="000000"/>
+                </a:solidFill>
+                <a:uFill>
+                  <a:solidFill>
+                    <a:srgbClr val="FFFFFF"/>
+                  </a:solidFill>
+                </a:uFill>
+                <a:latin typeface="Arial"/>
+              </a:rPr>
+              <a:t>linkurilor </a:t>
+            </a:r>
+            <a:r>
+              <a:rPr lang="ro-RO" sz="1600" b="0" strike="noStrike" spc="-1" dirty="0">
+                <a:solidFill>
+                  <a:srgbClr val="000000"/>
+                </a:solidFill>
+                <a:uFill>
+                  <a:solidFill>
+                    <a:srgbClr val="FFFFFF"/>
+                  </a:solidFill>
+                </a:uFill>
+                <a:latin typeface="Arial"/>
+              </a:rPr>
+              <a:t>cu </a:t>
+            </a:r>
+            <a:r>
+              <a:rPr lang="ro-RO" sz="1600" b="1" strike="noStrike" spc="-1" dirty="0">
                 <a:solidFill>
                   <a:srgbClr val="000000"/>
                 </a:solidFill>
@@ -8141,21 +8460,21 @@
               <a:t>http://</a:t>
             </a:r>
             <a:r>
-              <a:rPr lang="ro-RO" sz="1600" strike="noStrike" spc="-1" dirty="0" smtClean="0">
-                <a:solidFill>
-                  <a:srgbClr val="000000"/>
-                </a:solidFill>
-                <a:uFill>
-                  <a:solidFill>
-                    <a:srgbClr val="FFFFFF"/>
-                  </a:solidFill>
-                </a:uFill>
-                <a:latin typeface="Arial"/>
-              </a:rPr>
-              <a:t>. Daca serverul cere HTTPS, </a:t>
-            </a:r>
-            <a:r>
-              <a:rPr lang="ro-RO" sz="1600" b="1" strike="noStrike" spc="-1" dirty="0" smtClean="0">
+              <a:rPr lang="ro-RO" sz="1600" strike="noStrike" spc="-1" dirty="0">
+                <a:solidFill>
+                  <a:srgbClr val="000000"/>
+                </a:solidFill>
+                <a:uFill>
+                  <a:solidFill>
+                    <a:srgbClr val="FFFFFF"/>
+                  </a:solidFill>
+                </a:uFill>
+                <a:latin typeface="Arial"/>
+              </a:rPr>
+              <a:t>. Dacă serverul cere HTTPS, </a:t>
+            </a:r>
+            <a:r>
+              <a:rPr lang="ro-RO" sz="1600" b="1" strike="noStrike" spc="-1" dirty="0">
                 <a:solidFill>
                   <a:srgbClr val="000000"/>
                 </a:solidFill>
@@ -8169,18 +8488,18 @@
               <a:t>wget</a:t>
             </a:r>
             <a:r>
-              <a:rPr lang="ro-RO" sz="1600" strike="noStrike" spc="-1" dirty="0" smtClean="0">
-                <a:solidFill>
-                  <a:srgbClr val="000000"/>
-                </a:solidFill>
-                <a:uFill>
-                  <a:solidFill>
-                    <a:srgbClr val="FFFFFF"/>
-                  </a:solidFill>
-                </a:uFill>
-                <a:latin typeface="Arial"/>
-              </a:rPr>
-              <a:t> va primi un cod 301 și va redirecționa automat</a:t>
+              <a:rPr lang="ro-RO" sz="1600" strike="noStrike" spc="-1" dirty="0">
+                <a:solidFill>
+                  <a:srgbClr val="000000"/>
+                </a:solidFill>
+                <a:uFill>
+                  <a:solidFill>
+                    <a:srgbClr val="FFFFFF"/>
+                  </a:solidFill>
+                </a:uFill>
+                <a:latin typeface="Arial"/>
+              </a:rPr>
+              <a:t> va primi un cod 301 și va redirecționa automat către pagina corectă.</a:t>
             </a:r>
           </a:p>
           <a:p>
@@ -8195,7 +8514,7 @@
               <a:buChar char="•"/>
             </a:pPr>
             <a:r>
-              <a:rPr lang="ro-RO" sz="1600" spc="-1" dirty="0" smtClean="0">
+              <a:rPr lang="ro-RO" sz="1600" spc="-1" dirty="0">
                 <a:solidFill>
                   <a:srgbClr val="000000"/>
                 </a:solidFill>
@@ -8209,7 +8528,7 @@
               <a:t>Prevenirea buclelor infinite: Utilizarea fișierului </a:t>
             </a:r>
             <a:r>
-              <a:rPr lang="ro-RO" sz="1600" b="1" spc="-1" dirty="0" smtClean="0">
+              <a:rPr lang="ro-RO" sz="1600" b="1" spc="-1" dirty="0">
                 <a:solidFill>
                   <a:srgbClr val="000000"/>
                 </a:solidFill>
@@ -8223,7 +8542,7 @@
               <a:t>visited.txt</a:t>
             </a:r>
             <a:r>
-              <a:rPr lang="ro-RO" sz="1600" spc="-1" dirty="0" smtClean="0">
+              <a:rPr lang="ro-RO" sz="1600" spc="-1" dirty="0">
                 <a:solidFill>
                   <a:srgbClr val="000000"/>
                 </a:solidFill>
@@ -8237,7 +8556,7 @@
               <a:t> și verificarea cu </a:t>
             </a:r>
             <a:r>
-              <a:rPr lang="ro-RO" sz="1600" b="1" spc="-1" dirty="0" smtClean="0">
+              <a:rPr lang="ro-RO" sz="1600" b="1" spc="-1" dirty="0">
                 <a:solidFill>
                   <a:srgbClr val="000000"/>
                 </a:solidFill>
@@ -8251,7 +8570,7 @@
               <a:t>grep –Fqx</a:t>
             </a:r>
             <a:r>
-              <a:rPr lang="ro-RO" sz="1600" spc="-1" dirty="0" smtClean="0">
+              <a:rPr lang="ro-RO" sz="1600" spc="-1" dirty="0">
                 <a:solidFill>
                   <a:srgbClr val="000000"/>
                 </a:solidFill>
@@ -8300,7 +8619,7 @@
               <a:buChar char="•"/>
             </a:pPr>
             <a:r>
-              <a:rPr lang="ro-RO" sz="2000" strike="noStrike" spc="-1" dirty="0" smtClean="0">
+              <a:rPr lang="ro-RO" sz="2000" strike="noStrike" spc="-1" dirty="0">
                 <a:solidFill>
                   <a:srgbClr val="000000"/>
                 </a:solidFill>
@@ -8326,7 +8645,7 @@
               <a:buChar char="•"/>
             </a:pPr>
             <a:r>
-              <a:rPr lang="ro-RO" sz="1600" strike="noStrike" spc="-1" dirty="0" smtClean="0">
+              <a:rPr lang="ro-RO" sz="1600" strike="noStrike" spc="-1" dirty="0">
                 <a:solidFill>
                   <a:srgbClr val="000000"/>
                 </a:solidFill>
@@ -8352,7 +8671,7 @@
               <a:buChar char="•"/>
             </a:pPr>
             <a:r>
-              <a:rPr lang="ro-RO" sz="1600" spc="-1" dirty="0" smtClean="0">
+              <a:rPr lang="ro-RO" sz="1600" spc="-1" dirty="0">
                 <a:solidFill>
                   <a:srgbClr val="000000"/>
                 </a:solidFill>
@@ -8535,7 +8854,7 @@
               <a:buChar char="•"/>
             </a:pPr>
             <a:r>
-              <a:rPr lang="ro-RO" sz="2000" b="0" strike="noStrike" spc="-1" dirty="0" smtClean="0">
+              <a:rPr lang="ro-RO" sz="2000" b="0" strike="noStrike" spc="-1" dirty="0">
                 <a:solidFill>
                   <a:srgbClr val="000000"/>
                 </a:solidFill>
@@ -8561,7 +8880,7 @@
               <a:buChar char="•"/>
             </a:pPr>
             <a:r>
-              <a:rPr lang="ro-RO" sz="1600" spc="-1" dirty="0" smtClean="0">
+              <a:rPr lang="ro-RO" sz="1600" spc="-1" dirty="0">
                 <a:solidFill>
                   <a:srgbClr val="000000"/>
                 </a:solidFill>
@@ -8587,7 +8906,7 @@
               <a:buChar char="•"/>
             </a:pPr>
             <a:r>
-              <a:rPr lang="ro-RO" sz="1600" spc="-1" dirty="0" smtClean="0">
+              <a:rPr lang="ro-RO" sz="1600" spc="-1" dirty="0">
                 <a:solidFill>
                   <a:srgbClr val="000000"/>
                 </a:solidFill>
@@ -8601,7 +8920,7 @@
               <a:t>Țintă: Un site static simplu (ex: </a:t>
             </a:r>
             <a:r>
-              <a:rPr lang="ro-RO" sz="1600" b="1" spc="-1" dirty="0" smtClean="0">
+              <a:rPr lang="ro-RO" sz="1600" b="1" spc="-1" dirty="0">
                 <a:solidFill>
                   <a:srgbClr val="000000"/>
                 </a:solidFill>
@@ -8613,10 +8932,10 @@
                 <a:latin typeface="Arial"/>
                 <a:hlinkClick r:id="rId2"/>
               </a:rPr>
-              <a:t>http://fmi.unibuc.ro</a:t>
-            </a:r>
-            <a:r>
-              <a:rPr lang="ro-RO" sz="1600" spc="-1" dirty="0" smtClean="0">
+              <a:t>https://fmi.unibuc.ro</a:t>
+            </a:r>
+            <a:r>
+              <a:rPr lang="ro-RO" sz="1600" spc="-1" dirty="0">
                 <a:solidFill>
                   <a:srgbClr val="000000"/>
                 </a:solidFill>
@@ -8665,18 +8984,46 @@
               <a:buChar char="•"/>
             </a:pPr>
             <a:r>
-              <a:rPr lang="ro-RO" sz="2000" spc="-1" dirty="0" smtClean="0">
-                <a:solidFill>
-                  <a:srgbClr val="000000"/>
-                </a:solidFill>
-                <a:uFill>
-                  <a:solidFill>
-                    <a:srgbClr val="FFFFFF"/>
-                  </a:solidFill>
-                </a:uFill>
-                <a:latin typeface="Arial"/>
-              </a:rPr>
-              <a:t>Scenariu de tesatare</a:t>
+              <a:rPr lang="ro-RO" sz="2000" spc="-1" dirty="0">
+                <a:solidFill>
+                  <a:srgbClr val="000000"/>
+                </a:solidFill>
+                <a:uFill>
+                  <a:solidFill>
+                    <a:srgbClr val="FFFFFF"/>
+                  </a:solidFill>
+                </a:uFill>
+                <a:latin typeface="Arial"/>
+              </a:rPr>
+              <a:t>Scenariu de </a:t>
+            </a:r>
+            <a:r>
+              <a:rPr lang="ro-RO" sz="2000" spc="-1" dirty="0" err="1">
+                <a:solidFill>
+                  <a:srgbClr val="000000"/>
+                </a:solidFill>
+                <a:uFill>
+                  <a:solidFill>
+                    <a:srgbClr val="FFFFFF"/>
+                  </a:solidFill>
+                </a:uFill>
+                <a:latin typeface="Arial"/>
+              </a:rPr>
+              <a:t>tesatare</a:t>
+            </a:r>
+            <a:r>
+              <a:rPr lang="ro-RO" sz="2000" spc="-1" dirty="0">
+                <a:solidFill>
+                  <a:srgbClr val="000000"/>
+                </a:solidFill>
+                <a:uFill>
+                  <a:solidFill>
+                    <a:srgbClr val="FFFFFF"/>
+                  </a:solidFill>
+                </a:uFill>
+                <a:latin typeface="Arial"/>
+              </a:rPr>
+              <a:t> 1</a:t>
             </a:r>
           </a:p>
           <a:p>
@@ -8691,7 +9038,7 @@
               <a:buChar char="•"/>
             </a:pPr>
             <a:r>
-              <a:rPr lang="ro-RO" sz="1600" spc="-1" dirty="0" smtClean="0">
+              <a:rPr lang="ro-RO" sz="1600" spc="-1" dirty="0">
                 <a:solidFill>
                   <a:srgbClr val="000000"/>
                 </a:solidFill>
@@ -8705,37 +9052,79 @@
               <a:t>Pasul 1: Rulare </a:t>
             </a:r>
             <a:r>
-              <a:rPr lang="ro-RO" sz="1600" b="1" spc="-1" dirty="0" smtClean="0">
-                <a:solidFill>
-                  <a:srgbClr val="000000"/>
-                </a:solidFill>
-                <a:uFill>
-                  <a:solidFill>
-                    <a:srgbClr val="FFFFFF"/>
-                  </a:solidFill>
-                </a:uFill>
-                <a:latin typeface="Arial"/>
-              </a:rPr>
-              <a:t>./lwget </a:t>
-            </a:r>
-            <a:r>
-              <a:rPr lang="ro-RO" sz="1600" b="1" spc="-1" dirty="0" smtClean="0">
-                <a:solidFill>
-                  <a:srgbClr val="000000"/>
-                </a:solidFill>
-                <a:uFill>
-                  <a:solidFill>
-                    <a:srgbClr val="FFFFFF"/>
-                  </a:solidFill>
-                </a:uFill>
-                <a:latin typeface="Arial"/>
-                <a:hlinkClick r:id="rId3"/>
-              </a:rPr>
-              <a:t>http://site.com</a:t>
-            </a:r>
-            <a:endParaRPr lang="ro-RO" sz="1600" b="1" spc="-1" dirty="0" smtClean="0">
+              <a:rPr lang="ro-RO" sz="1600" b="1" spc="-1" dirty="0">
+                <a:solidFill>
+                  <a:srgbClr val="000000"/>
+                </a:solidFill>
+                <a:uFill>
+                  <a:solidFill>
+                    <a:srgbClr val="FFFFFF"/>
+                  </a:solidFill>
+                </a:uFill>
+                <a:latin typeface="Arial"/>
+              </a:rPr>
+              <a:t>./</a:t>
+            </a:r>
+            <a:r>
+              <a:rPr lang="ro-RO" sz="1600" b="1" spc="-1" dirty="0" err="1">
+                <a:solidFill>
+                  <a:srgbClr val="000000"/>
+                </a:solidFill>
+                <a:uFill>
+                  <a:solidFill>
+                    <a:srgbClr val="FFFFFF"/>
+                  </a:solidFill>
+                </a:uFill>
+                <a:latin typeface="Arial"/>
+              </a:rPr>
+              <a:t>lget</a:t>
+            </a:r>
+            <a:r>
+              <a:rPr lang="ro-RO" sz="1600" b="1" spc="-1" dirty="0">
+                <a:solidFill>
+                  <a:srgbClr val="000000"/>
+                </a:solidFill>
+                <a:uFill>
+                  <a:solidFill>
+                    <a:srgbClr val="FFFFFF"/>
+                  </a:solidFill>
+                </a:uFill>
+                <a:latin typeface="Arial"/>
+              </a:rPr>
+              <a:t> </a:t>
+            </a:r>
+            <a:r>
+              <a:rPr lang="ro-RO" sz="1600" b="1" spc="-1" dirty="0">
+                <a:solidFill>
+                  <a:srgbClr val="000000"/>
+                </a:solidFill>
+                <a:uFill>
+                  <a:solidFill>
+                    <a:srgbClr val="FFFFFF"/>
+                  </a:solidFill>
+                </a:uFill>
+                <a:latin typeface="Arial"/>
+                <a:hlinkClick r:id="rId3" invalidUrl="https:///"/>
+              </a:rPr>
+              <a:t>https://</a:t>
+            </a:r>
+            <a:r>
+              <a:rPr lang="ro-RO" sz="1600" b="1" spc="-1" dirty="0">
+                <a:solidFill>
+                  <a:srgbClr val="000000"/>
+                </a:solidFill>
+                <a:uFill>
+                  <a:solidFill>
+                    <a:srgbClr val="FFFFFF"/>
+                  </a:solidFill>
+                </a:uFill>
+                <a:hlinkClick r:id="rId4"/>
+              </a:rPr>
+              <a:t>fmi.unibuc.ro</a:t>
+            </a:r>
+            <a:endParaRPr lang="ro-RO" sz="1600" b="1" spc="-1" dirty="0">
               <a:solidFill>
-                <a:srgbClr val="000000"/>
+                <a:srgbClr val="0432FF"/>
               </a:solidFill>
               <a:uFill>
                 <a:solidFill>
@@ -8757,7 +9146,7 @@
               <a:buChar char="•"/>
             </a:pPr>
             <a:r>
-              <a:rPr lang="ro-RO" sz="1600" i="1" spc="-1" dirty="0" smtClean="0">
+              <a:rPr lang="ro-RO" sz="1600" i="1" spc="-1" dirty="0">
                 <a:solidFill>
                   <a:srgbClr val="000000"/>
                 </a:solidFill>
@@ -8771,7 +9160,7 @@
               <a:t>Rezultat:</a:t>
             </a:r>
             <a:r>
-              <a:rPr lang="ro-RO" sz="1600" b="1" i="1" spc="-1" dirty="0" smtClean="0">
+              <a:rPr lang="ro-RO" sz="1600" b="1" i="1" spc="-1" dirty="0">
                 <a:solidFill>
                   <a:srgbClr val="000000"/>
                 </a:solidFill>
@@ -8785,7 +9174,7 @@
               <a:t> </a:t>
             </a:r>
             <a:r>
-              <a:rPr lang="ro-RO" sz="1600" spc="-1" dirty="0" smtClean="0">
+              <a:rPr lang="ro-RO" sz="1600" spc="-1" dirty="0">
                 <a:solidFill>
                   <a:srgbClr val="000000"/>
                 </a:solidFill>
@@ -8799,7 +9188,7 @@
               <a:t>Se descarcă </a:t>
             </a:r>
             <a:r>
-              <a:rPr lang="ro-RO" sz="1600" b="1" spc="-1" dirty="0" smtClean="0">
+              <a:rPr lang="ro-RO" sz="1600" b="1" spc="-1" dirty="0">
                 <a:solidFill>
                   <a:srgbClr val="000000"/>
                 </a:solidFill>
@@ -8813,7 +9202,7 @@
               <a:t>index.html</a:t>
             </a:r>
             <a:r>
-              <a:rPr lang="ro-RO" sz="1600" spc="-1" dirty="0" smtClean="0">
+              <a:rPr lang="ro-RO" sz="1600" spc="-1" dirty="0">
                 <a:solidFill>
                   <a:srgbClr val="000000"/>
                 </a:solidFill>
@@ -8827,7 +9216,7 @@
               <a:t>. Se creează </a:t>
             </a:r>
             <a:r>
-              <a:rPr lang="ro-RO" sz="1600" b="1" spc="-1" dirty="0" smtClean="0">
+              <a:rPr lang="ro-RO" sz="1600" b="1" spc="-1" dirty="0">
                 <a:solidFill>
                   <a:srgbClr val="000000"/>
                 </a:solidFill>
@@ -8841,7 +9230,7 @@
               <a:t>promises.txt</a:t>
             </a:r>
             <a:r>
-              <a:rPr lang="ro-RO" sz="1600" spc="-1" dirty="0" smtClean="0">
+              <a:rPr lang="ro-RO" sz="1600" spc="-1" dirty="0">
                 <a:solidFill>
                   <a:srgbClr val="000000"/>
                 </a:solidFill>
@@ -8867,7 +9256,7 @@
               <a:buChar char="•"/>
             </a:pPr>
             <a:r>
-              <a:rPr lang="ro-RO" sz="1600" spc="-1" dirty="0" smtClean="0">
+              <a:rPr lang="ro-RO" sz="1600" spc="-1" dirty="0">
                 <a:solidFill>
                   <a:srgbClr val="000000"/>
                 </a:solidFill>
@@ -8881,33 +9270,86 @@
               <a:t>Pasul 2: Rulare </a:t>
             </a:r>
             <a:r>
-              <a:rPr lang="ro-RO" sz="1600" b="1" spc="-1" dirty="0" smtClean="0">
-                <a:solidFill>
-                  <a:srgbClr val="000000"/>
-                </a:solidFill>
-                <a:uFill>
-                  <a:solidFill>
-                    <a:srgbClr val="FFFFFF"/>
-                  </a:solidFill>
-                </a:uFill>
-                <a:latin typeface="Arial"/>
-              </a:rPr>
-              <a:t>./lwget </a:t>
-            </a:r>
-            <a:r>
-              <a:rPr lang="ro-RO" sz="1600" spc="-1" dirty="0" smtClean="0">
-                <a:solidFill>
-                  <a:srgbClr val="000000"/>
-                </a:solidFill>
-                <a:uFill>
-                  <a:solidFill>
-                    <a:srgbClr val="FFFFFF"/>
-                  </a:solidFill>
-                </a:uFill>
-                <a:latin typeface="Arial"/>
-              </a:rPr>
-              <a:t>(fără argumente).</a:t>
-            </a:r>
+              <a:rPr lang="ro-RO" sz="1600" b="1" spc="-1" dirty="0">
+                <a:solidFill>
+                  <a:srgbClr val="000000"/>
+                </a:solidFill>
+                <a:uFill>
+                  <a:solidFill>
+                    <a:srgbClr val="FFFFFF"/>
+                  </a:solidFill>
+                </a:uFill>
+                <a:latin typeface="Arial"/>
+              </a:rPr>
+              <a:t>./</a:t>
+            </a:r>
+            <a:r>
+              <a:rPr lang="ro-RO" sz="1600" b="1" spc="-1" dirty="0" err="1">
+                <a:solidFill>
+                  <a:srgbClr val="000000"/>
+                </a:solidFill>
+                <a:uFill>
+                  <a:solidFill>
+                    <a:srgbClr val="FFFFFF"/>
+                  </a:solidFill>
+                </a:uFill>
+                <a:latin typeface="Arial"/>
+              </a:rPr>
+              <a:t>lget</a:t>
+            </a:r>
+            <a:r>
+              <a:rPr lang="ro-RO" sz="1600" b="1" spc="-1" dirty="0">
+                <a:solidFill>
+                  <a:srgbClr val="000000"/>
+                </a:solidFill>
+                <a:uFill>
+                  <a:solidFill>
+                    <a:srgbClr val="FFFFFF"/>
+                  </a:solidFill>
+                </a:uFill>
+                <a:latin typeface="Arial"/>
+              </a:rPr>
+              <a:t> </a:t>
+            </a:r>
+            <a:r>
+              <a:rPr lang="ro-RO" sz="1600" b="1" spc="-1" dirty="0">
+                <a:solidFill>
+                  <a:srgbClr val="000000"/>
+                </a:solidFill>
+                <a:uFill>
+                  <a:solidFill>
+                    <a:srgbClr val="FFFFFF"/>
+                  </a:solidFill>
+                </a:uFill>
+                <a:hlinkClick r:id="rId5" invalidUrl="https:///"/>
+              </a:rPr>
+              <a:t>https://</a:t>
+            </a:r>
+            <a:r>
+              <a:rPr lang="ro-RO" sz="1600" b="1" spc="-1" dirty="0">
+                <a:solidFill>
+                  <a:srgbClr val="000000"/>
+                </a:solidFill>
+                <a:uFill>
+                  <a:solidFill>
+                    <a:srgbClr val="FFFFFF"/>
+                  </a:solidFill>
+                </a:uFill>
+                <a:hlinkClick r:id="rId4"/>
+              </a:rPr>
+              <a:t>fmi.unibuc.ro</a:t>
+            </a:r>
+            <a:endParaRPr lang="ro-RO" sz="1600" spc="-1" dirty="0">
+              <a:solidFill>
+                <a:srgbClr val="000000"/>
+              </a:solidFill>
+              <a:uFill>
+                <a:solidFill>
+                  <a:srgbClr val="FFFFFF"/>
+                </a:solidFill>
+              </a:uFill>
+              <a:latin typeface="Arial"/>
+            </a:endParaRPr>
           </a:p>
           <a:p>
             <a:pPr marL="1143000" lvl="2" indent="-226440">
@@ -8921,7 +9363,7 @@
               <a:buChar char="•"/>
             </a:pPr>
             <a:r>
-              <a:rPr lang="ro-RO" sz="1600" i="1" strike="noStrike" spc="-1" dirty="0" smtClean="0">
+              <a:rPr lang="ro-RO" sz="1600" i="1" strike="noStrike" spc="-1" dirty="0">
                 <a:solidFill>
                   <a:srgbClr val="000000"/>
                 </a:solidFill>
@@ -8935,7 +9377,7 @@
               <a:t>Rezultat:</a:t>
             </a:r>
             <a:r>
-              <a:rPr lang="ro-RO" sz="1600" strike="noStrike" spc="-1" dirty="0" smtClean="0">
+              <a:rPr lang="ro-RO" sz="1600" strike="noStrike" spc="-1" dirty="0">
                 <a:solidFill>
                   <a:srgbClr val="000000"/>
                 </a:solidFill>
@@ -8949,21 +9391,35 @@
               <a:t> Scriptul citește promisiunile, descarcă paginile de nivel 1. Fișierul </a:t>
             </a:r>
             <a:r>
-              <a:rPr lang="ro-RO" sz="1600" b="1" strike="noStrike" spc="-1" dirty="0" smtClean="0">
-                <a:solidFill>
-                  <a:srgbClr val="000000"/>
-                </a:solidFill>
-                <a:uFill>
-                  <a:solidFill>
-                    <a:srgbClr val="FFFFFF"/>
-                  </a:solidFill>
-                </a:uFill>
-                <a:latin typeface="Arial"/>
-              </a:rPr>
-              <a:t>promises.txt </a:t>
-            </a:r>
-            <a:r>
-              <a:rPr lang="ro-RO" sz="1600" strike="noStrike" spc="-1" dirty="0" smtClean="0">
+              <a:rPr lang="ro-RO" sz="1600" b="1" strike="noStrike" spc="-1" dirty="0" err="1">
+                <a:solidFill>
+                  <a:srgbClr val="000000"/>
+                </a:solidFill>
+                <a:uFill>
+                  <a:solidFill>
+                    <a:srgbClr val="FFFFFF"/>
+                  </a:solidFill>
+                </a:uFill>
+                <a:latin typeface="Arial"/>
+              </a:rPr>
+              <a:t>promises.txt</a:t>
+            </a:r>
+            <a:r>
+              <a:rPr lang="ro-RO" sz="1600" b="1" strike="noStrike" spc="-1" dirty="0">
+                <a:solidFill>
+                  <a:srgbClr val="000000"/>
+                </a:solidFill>
+                <a:uFill>
+                  <a:solidFill>
+                    <a:srgbClr val="FFFFFF"/>
+                  </a:solidFill>
+                </a:uFill>
+                <a:latin typeface="Arial"/>
+              </a:rPr>
+              <a:t> </a:t>
+            </a:r>
+            <a:r>
+              <a:rPr lang="ro-RO" sz="1600" strike="noStrike" spc="-1" dirty="0">
                 <a:solidFill>
                   <a:srgbClr val="000000"/>
                 </a:solidFill>
@@ -8989,7 +9445,7 @@
               <a:buChar char="•"/>
             </a:pPr>
             <a:r>
-              <a:rPr lang="ro-RO" sz="1600" spc="-1" dirty="0" smtClean="0">
+              <a:rPr lang="ro-RO" sz="1600" spc="-1" dirty="0">
                 <a:solidFill>
                   <a:srgbClr val="000000"/>
                 </a:solidFill>
@@ -9003,7 +9459,7 @@
               <a:t>Verificare </a:t>
             </a:r>
             <a:r>
-              <a:rPr lang="ro-RO" sz="1600" b="1" spc="-1" dirty="0" smtClean="0">
+              <a:rPr lang="ro-RO" sz="1600" b="1" spc="-1" dirty="0">
                 <a:solidFill>
                   <a:srgbClr val="000000"/>
                 </a:solidFill>
@@ -9017,20 +9473,792 @@
               <a:t>tree </a:t>
             </a:r>
             <a:r>
-              <a:rPr lang="ro-RO" sz="1600" spc="-1" dirty="0" smtClean="0">
-                <a:solidFill>
-                  <a:srgbClr val="000000"/>
-                </a:solidFill>
-                <a:uFill>
-                  <a:solidFill>
-                    <a:srgbClr val="FFFFFF"/>
-                  </a:solidFill>
-                </a:uFill>
-                <a:latin typeface="Arial"/>
-              </a:rPr>
-              <a:t>în directorul descărcat pentru a vizualiza ierarhia.</a:t>
-            </a:r>
-            <a:endParaRPr lang="en-US" sz="1600" strike="noStrike" spc="-1" dirty="0">
+              <a:rPr lang="ro-RO" sz="1600" spc="-1" dirty="0">
+                <a:solidFill>
+                  <a:srgbClr val="000000"/>
+                </a:solidFill>
+                <a:uFill>
+                  <a:solidFill>
+                    <a:srgbClr val="FFFFFF"/>
+                  </a:solidFill>
+                </a:uFill>
+                <a:latin typeface="Arial"/>
+              </a:rPr>
+              <a:t>în directorul descărcat pentru a vizualiza ierarhia</a:t>
+            </a:r>
+          </a:p>
+          <a:p>
+            <a:pPr marL="459360" lvl="1">
+              <a:lnSpc>
+                <a:spcPct val="90000"/>
+              </a:lnSpc>
+              <a:buClr>
+                <a:srgbClr val="000000"/>
+              </a:buClr>
+            </a:pPr>
+            <a:endParaRPr lang="ro-RO" sz="1600" spc="-1" dirty="0">
+              <a:solidFill>
+                <a:srgbClr val="000000"/>
+              </a:solidFill>
+              <a:uFill>
+                <a:solidFill>
+                  <a:srgbClr val="FFFFFF"/>
+                </a:solidFill>
+              </a:uFill>
+            </a:endParaRPr>
+          </a:p>
+          <a:p>
+            <a:pPr marL="228600" indent="-226440">
+              <a:lnSpc>
+                <a:spcPct val="90000"/>
+              </a:lnSpc>
+              <a:buClr>
+                <a:srgbClr val="000000"/>
+              </a:buClr>
+              <a:buFont typeface="Arial"/>
+              <a:buChar char="•"/>
+            </a:pPr>
+            <a:r>
+              <a:rPr lang="ro-RO" sz="2000" spc="-1" dirty="0">
+                <a:solidFill>
+                  <a:srgbClr val="000000"/>
+                </a:solidFill>
+                <a:uFill>
+                  <a:solidFill>
+                    <a:srgbClr val="FFFFFF"/>
+                  </a:solidFill>
+                </a:uFill>
+              </a:rPr>
+              <a:t>Scenariu de </a:t>
+            </a:r>
+            <a:r>
+              <a:rPr lang="ro-RO" sz="2000" spc="-1" dirty="0" err="1">
+                <a:solidFill>
+                  <a:srgbClr val="000000"/>
+                </a:solidFill>
+                <a:uFill>
+                  <a:solidFill>
+                    <a:srgbClr val="FFFFFF"/>
+                  </a:solidFill>
+                </a:uFill>
+              </a:rPr>
+              <a:t>tesatare</a:t>
+            </a:r>
+            <a:r>
+              <a:rPr lang="ro-RO" sz="2000" spc="-1" dirty="0">
+                <a:solidFill>
+                  <a:srgbClr val="000000"/>
+                </a:solidFill>
+                <a:uFill>
+                  <a:solidFill>
+                    <a:srgbClr val="FFFFFF"/>
+                  </a:solidFill>
+                </a:uFill>
+              </a:rPr>
+              <a:t> 2</a:t>
+            </a:r>
+          </a:p>
+          <a:p>
+            <a:pPr marL="685800" lvl="1" indent="-226440">
+              <a:lnSpc>
+                <a:spcPct val="90000"/>
+              </a:lnSpc>
+              <a:buClr>
+                <a:srgbClr val="000000"/>
+              </a:buClr>
+              <a:buFont typeface="Arial"/>
+              <a:buChar char="•"/>
+            </a:pPr>
+            <a:r>
+              <a:rPr lang="en-US" sz="1600" dirty="0" err="1"/>
+              <a:t>Linkurile</a:t>
+            </a:r>
+            <a:r>
+              <a:rPr lang="en-US" sz="1600" dirty="0"/>
+              <a:t> relative </a:t>
+            </a:r>
+            <a:r>
+              <a:rPr lang="en-US" sz="1600" dirty="0" err="1"/>
+              <a:t>detectate</a:t>
+            </a:r>
+            <a:r>
+              <a:rPr lang="en-US" sz="1600" dirty="0"/>
+              <a:t> sunt </a:t>
+            </a:r>
+            <a:r>
+              <a:rPr lang="en-US" sz="1600" dirty="0" err="1"/>
+              <a:t>reconstruite</a:t>
+            </a:r>
+            <a:r>
+              <a:rPr lang="en-US" sz="1600" dirty="0"/>
+              <a:t> </a:t>
+            </a:r>
+            <a:r>
+              <a:rPr lang="en-US" sz="1600" dirty="0" err="1"/>
+              <a:t>prin</a:t>
+            </a:r>
+            <a:r>
+              <a:rPr lang="en-US" sz="1600" dirty="0"/>
+              <a:t> </a:t>
+            </a:r>
+            <a:r>
+              <a:rPr lang="en-US" sz="1600" dirty="0" err="1"/>
+              <a:t>atașarea</a:t>
+            </a:r>
+            <a:r>
+              <a:rPr lang="en-US" sz="1600" dirty="0"/>
+              <a:t> </a:t>
+            </a:r>
+            <a:r>
+              <a:rPr lang="en-US" sz="1600" dirty="0" err="1"/>
+              <a:t>prefixului</a:t>
+            </a:r>
+            <a:r>
+              <a:rPr lang="en-US" sz="1600" dirty="0"/>
+              <a:t> </a:t>
+            </a:r>
+            <a:r>
+              <a:rPr lang="en-US" sz="1600" b="1" i="1" dirty="0"/>
+              <a:t>http://</a:t>
+            </a:r>
+            <a:r>
+              <a:rPr lang="en-US" sz="1600" dirty="0"/>
+              <a:t>. </a:t>
+            </a:r>
+            <a:r>
+              <a:rPr lang="en-US" sz="1600" dirty="0" err="1"/>
+              <a:t>Dacă</a:t>
+            </a:r>
+            <a:r>
+              <a:rPr lang="en-US" sz="1600" dirty="0"/>
+              <a:t> </a:t>
+            </a:r>
+            <a:r>
+              <a:rPr lang="en-US" sz="1600" dirty="0" err="1"/>
+              <a:t>serverul</a:t>
+            </a:r>
+            <a:r>
+              <a:rPr lang="en-US" sz="1600" dirty="0"/>
+              <a:t> </a:t>
+            </a:r>
+            <a:r>
+              <a:rPr lang="en-US" sz="1600" dirty="0" err="1"/>
+              <a:t>impune</a:t>
+            </a:r>
+            <a:r>
+              <a:rPr lang="en-US" sz="1600" dirty="0"/>
+              <a:t> </a:t>
+            </a:r>
+            <a:r>
+              <a:rPr lang="en-US" sz="1600" dirty="0" err="1"/>
+              <a:t>conexiunea</a:t>
+            </a:r>
+            <a:r>
+              <a:rPr lang="en-US" sz="1600" dirty="0"/>
+              <a:t> </a:t>
+            </a:r>
+            <a:r>
+              <a:rPr lang="en-US" sz="1600" dirty="0" err="1"/>
+              <a:t>securizată</a:t>
+            </a:r>
+            <a:r>
+              <a:rPr lang="en-US" sz="1600" dirty="0"/>
+              <a:t>, </a:t>
+            </a:r>
+            <a:r>
+              <a:rPr lang="en-US" sz="1600" b="1" dirty="0" err="1"/>
+              <a:t>wget</a:t>
+            </a:r>
+            <a:r>
+              <a:rPr lang="en-US" sz="1600" dirty="0"/>
+              <a:t> </a:t>
+            </a:r>
+            <a:r>
+              <a:rPr lang="en-US" sz="1600" dirty="0" err="1"/>
+              <a:t>va</a:t>
+            </a:r>
+            <a:r>
+              <a:rPr lang="en-US" sz="1600" dirty="0"/>
+              <a:t> </a:t>
+            </a:r>
+            <a:r>
+              <a:rPr lang="en-US" sz="1600" dirty="0" err="1"/>
+              <a:t>gestiona</a:t>
+            </a:r>
+            <a:r>
+              <a:rPr lang="en-US" sz="1600" dirty="0"/>
+              <a:t> automat </a:t>
+            </a:r>
+            <a:r>
+              <a:rPr lang="en-US" sz="1600" dirty="0" err="1"/>
+              <a:t>redirecționarea</a:t>
+            </a:r>
+            <a:r>
+              <a:rPr lang="en-US" sz="1600" dirty="0"/>
+              <a:t> 301 </a:t>
+            </a:r>
+            <a:r>
+              <a:rPr lang="en-US" sz="1600" dirty="0" err="1"/>
+              <a:t>către</a:t>
+            </a:r>
+            <a:r>
+              <a:rPr lang="en-US" sz="1600" dirty="0"/>
+              <a:t> HTTPS. </a:t>
+            </a:r>
+            <a:r>
+              <a:rPr lang="en-US" sz="1600" dirty="0" err="1"/>
+              <a:t>Utilizarea</a:t>
+            </a:r>
+            <a:r>
+              <a:rPr lang="en-US" sz="1600" dirty="0"/>
+              <a:t> </a:t>
+            </a:r>
+            <a:r>
+              <a:rPr lang="en-US" sz="1600" dirty="0" err="1"/>
+              <a:t>directă</a:t>
+            </a:r>
+            <a:r>
+              <a:rPr lang="en-US" sz="1600" dirty="0"/>
+              <a:t> a </a:t>
+            </a:r>
+            <a:r>
+              <a:rPr lang="en-US" sz="1600" dirty="0" err="1"/>
+              <a:t>prefixului</a:t>
+            </a:r>
+            <a:r>
+              <a:rPr lang="en-US" sz="1600" dirty="0"/>
+              <a:t> </a:t>
+            </a:r>
+            <a:r>
+              <a:rPr lang="en-US" sz="1600" b="1" i="1" dirty="0"/>
+              <a:t>https://</a:t>
+            </a:r>
+            <a:r>
+              <a:rPr lang="en-US" sz="1600" i="1" dirty="0"/>
+              <a:t> </a:t>
+            </a:r>
+            <a:r>
+              <a:rPr lang="en-US" sz="1600" dirty="0" err="1"/>
+              <a:t>ar</a:t>
+            </a:r>
+            <a:r>
+              <a:rPr lang="en-US" sz="1600" dirty="0"/>
+              <a:t> fi </a:t>
+            </a:r>
+            <a:r>
+              <a:rPr lang="en-US" sz="1600" dirty="0" err="1"/>
+              <a:t>cauzat</a:t>
+            </a:r>
+            <a:r>
+              <a:rPr lang="en-US" sz="1600" dirty="0"/>
+              <a:t> </a:t>
+            </a:r>
+            <a:r>
+              <a:rPr lang="en-US" sz="1600" dirty="0" err="1"/>
+              <a:t>eșecul</a:t>
+            </a:r>
+            <a:r>
+              <a:rPr lang="en-US" sz="1600" dirty="0"/>
+              <a:t> </a:t>
+            </a:r>
+            <a:r>
+              <a:rPr lang="en-US" sz="1600" dirty="0" err="1" smtClean="0"/>
+              <a:t>operați</a:t>
+            </a:r>
+            <a:r>
+              <a:rPr lang="ro-RO" sz="1600" dirty="0" smtClean="0"/>
+              <a:t>e</a:t>
+            </a:r>
+            <a:r>
+              <a:rPr lang="en-US" sz="1600" dirty="0" err="1" smtClean="0"/>
+              <a:t>i</a:t>
+            </a:r>
+            <a:r>
+              <a:rPr lang="en-US" sz="1600" dirty="0"/>
+              <a:t>.</a:t>
+            </a:r>
+          </a:p>
+          <a:p>
+            <a:pPr marL="685800" lvl="1" indent="-226440">
+              <a:lnSpc>
+                <a:spcPct val="90000"/>
+              </a:lnSpc>
+              <a:buClr>
+                <a:srgbClr val="000000"/>
+              </a:buClr>
+              <a:buFont typeface="Arial"/>
+              <a:buChar char="•"/>
+            </a:pPr>
+            <a:r>
+              <a:rPr lang="ro-RO" sz="1600" spc="-1" dirty="0">
+                <a:solidFill>
+                  <a:srgbClr val="000000"/>
+                </a:solidFill>
+                <a:uFill>
+                  <a:solidFill>
+                    <a:srgbClr val="FFFFFF"/>
+                  </a:solidFill>
+                </a:uFill>
+              </a:rPr>
+              <a:t>Exemplu 1 (</a:t>
+            </a:r>
+            <a:r>
+              <a:rPr lang="ro-RO" sz="1600" i="1" spc="-1" dirty="0" err="1">
+                <a:solidFill>
+                  <a:srgbClr val="000000"/>
+                </a:solidFill>
+                <a:uFill>
+                  <a:solidFill>
+                    <a:srgbClr val="FFFFFF"/>
+                  </a:solidFill>
+                </a:uFill>
+              </a:rPr>
+              <a:t>http</a:t>
+            </a:r>
+            <a:r>
+              <a:rPr lang="ro-RO" sz="1600" i="1" spc="-1" dirty="0">
+                <a:solidFill>
+                  <a:srgbClr val="000000"/>
+                </a:solidFill>
+                <a:uFill>
+                  <a:solidFill>
+                    <a:srgbClr val="FFFFFF"/>
+                  </a:solidFill>
+                </a:uFill>
+              </a:rPr>
+              <a:t>://</a:t>
+            </a:r>
+            <a:r>
+              <a:rPr lang="ro-RO" sz="1600" spc="-1" dirty="0">
+                <a:solidFill>
+                  <a:srgbClr val="000000"/>
+                </a:solidFill>
+                <a:uFill>
+                  <a:solidFill>
+                    <a:srgbClr val="FFFFFF"/>
+                  </a:solidFill>
+                </a:uFill>
+              </a:rPr>
+              <a:t>): Rulare </a:t>
+            </a:r>
+            <a:r>
+              <a:rPr lang="ro-RO" sz="1600" b="1" spc="-1" dirty="0">
+                <a:solidFill>
+                  <a:srgbClr val="000000"/>
+                </a:solidFill>
+                <a:uFill>
+                  <a:solidFill>
+                    <a:srgbClr val="FFFFFF"/>
+                  </a:solidFill>
+                </a:uFill>
+              </a:rPr>
+              <a:t>./</a:t>
+            </a:r>
+            <a:r>
+              <a:rPr lang="ro-RO" sz="1600" b="1" spc="-1" dirty="0" err="1">
+                <a:solidFill>
+                  <a:srgbClr val="000000"/>
+                </a:solidFill>
+                <a:uFill>
+                  <a:solidFill>
+                    <a:srgbClr val="FFFFFF"/>
+                  </a:solidFill>
+                </a:uFill>
+              </a:rPr>
+              <a:t>lget</a:t>
+            </a:r>
+            <a:r>
+              <a:rPr lang="ro-RO" sz="1600" b="1" spc="-1" dirty="0">
+                <a:solidFill>
+                  <a:srgbClr val="000000"/>
+                </a:solidFill>
+                <a:uFill>
+                  <a:solidFill>
+                    <a:srgbClr val="FFFFFF"/>
+                  </a:solidFill>
+                </a:uFill>
+              </a:rPr>
+              <a:t> </a:t>
+            </a:r>
+            <a:r>
+              <a:rPr lang="ro-RO" sz="1600" b="1" spc="-1" dirty="0" err="1">
+                <a:solidFill>
+                  <a:srgbClr val="0432FF"/>
+                </a:solidFill>
+                <a:uFill>
+                  <a:solidFill>
+                    <a:srgbClr val="FFFFFF"/>
+                  </a:solidFill>
+                </a:uFill>
+              </a:rPr>
+              <a:t>httpforever.com</a:t>
+            </a:r>
+            <a:endParaRPr lang="ro-RO" sz="1600" b="1" spc="-1" dirty="0">
+              <a:solidFill>
+                <a:srgbClr val="0432FF"/>
+              </a:solidFill>
+              <a:uFill>
+                <a:solidFill>
+                  <a:srgbClr val="FFFFFF"/>
+                </a:solidFill>
+              </a:uFill>
+            </a:endParaRPr>
+          </a:p>
+          <a:p>
+            <a:pPr marL="1143000" lvl="2" indent="-226440">
+              <a:lnSpc>
+                <a:spcPct val="90000"/>
+              </a:lnSpc>
+              <a:buClr>
+                <a:srgbClr val="000000"/>
+              </a:buClr>
+              <a:buFont typeface="Arial"/>
+              <a:buChar char="•"/>
+            </a:pPr>
+            <a:r>
+              <a:rPr lang="ro-RO" sz="1600" i="1" spc="-1" dirty="0">
+                <a:solidFill>
+                  <a:srgbClr val="000000"/>
+                </a:solidFill>
+                <a:uFill>
+                  <a:solidFill>
+                    <a:srgbClr val="FFFFFF"/>
+                  </a:solidFill>
+                </a:uFill>
+              </a:rPr>
+              <a:t>Rezultat:</a:t>
+            </a:r>
+            <a:r>
+              <a:rPr lang="ro-RO" sz="1600" b="1" i="1" spc="-1" dirty="0">
+                <a:solidFill>
+                  <a:srgbClr val="000000"/>
+                </a:solidFill>
+                <a:uFill>
+                  <a:solidFill>
+                    <a:srgbClr val="FFFFFF"/>
+                  </a:solidFill>
+                </a:uFill>
+              </a:rPr>
+              <a:t> </a:t>
+            </a:r>
+            <a:r>
+              <a:rPr lang="ro-RO" sz="1600" spc="-1" dirty="0">
+                <a:solidFill>
+                  <a:srgbClr val="000000"/>
+                </a:solidFill>
+                <a:uFill>
+                  <a:solidFill>
+                    <a:srgbClr val="FFFFFF"/>
+                  </a:solidFill>
+                </a:uFill>
+              </a:rPr>
+              <a:t>Se descarcă </a:t>
+            </a:r>
+            <a:r>
+              <a:rPr lang="ro-RO" sz="1600" b="1" spc="-1" dirty="0" err="1">
+                <a:solidFill>
+                  <a:srgbClr val="000000"/>
+                </a:solidFill>
+                <a:uFill>
+                  <a:solidFill>
+                    <a:srgbClr val="FFFFFF"/>
+                  </a:solidFill>
+                </a:uFill>
+              </a:rPr>
+              <a:t>index.html</a:t>
+            </a:r>
+            <a:r>
+              <a:rPr lang="ro-RO" sz="1600" spc="-1" dirty="0">
+                <a:solidFill>
+                  <a:srgbClr val="000000"/>
+                </a:solidFill>
+                <a:uFill>
+                  <a:solidFill>
+                    <a:srgbClr val="FFFFFF"/>
+                  </a:solidFill>
+                </a:uFill>
+              </a:rPr>
+              <a:t>. Se creează </a:t>
+            </a:r>
+            <a:r>
+              <a:rPr lang="ro-RO" sz="1600" b="1" spc="-1" dirty="0" err="1">
+                <a:solidFill>
+                  <a:srgbClr val="000000"/>
+                </a:solidFill>
+                <a:uFill>
+                  <a:solidFill>
+                    <a:srgbClr val="FFFFFF"/>
+                  </a:solidFill>
+                </a:uFill>
+              </a:rPr>
+              <a:t>promises.txt</a:t>
+            </a:r>
+            <a:r>
+              <a:rPr lang="ro-RO" sz="1600" spc="-1" dirty="0">
+                <a:solidFill>
+                  <a:srgbClr val="000000"/>
+                </a:solidFill>
+                <a:uFill>
+                  <a:solidFill>
+                    <a:srgbClr val="FFFFFF"/>
+                  </a:solidFill>
+                </a:uFill>
+              </a:rPr>
+              <a:t> cu link-urile din meniu.</a:t>
+            </a:r>
+          </a:p>
+          <a:p>
+            <a:pPr marL="685800" lvl="1" indent="-226440">
+              <a:lnSpc>
+                <a:spcPct val="90000"/>
+              </a:lnSpc>
+              <a:buClr>
+                <a:srgbClr val="000000"/>
+              </a:buClr>
+              <a:buFont typeface="Arial"/>
+              <a:buChar char="•"/>
+            </a:pPr>
+            <a:r>
+              <a:rPr lang="ro-RO" sz="1600" spc="-1" dirty="0">
+                <a:solidFill>
+                  <a:srgbClr val="000000"/>
+                </a:solidFill>
+                <a:uFill>
+                  <a:solidFill>
+                    <a:srgbClr val="FFFFFF"/>
+                  </a:solidFill>
+                </a:uFill>
+              </a:rPr>
+              <a:t>Exemplu 2 (</a:t>
+            </a:r>
+            <a:r>
+              <a:rPr lang="ro-RO" sz="1600" i="1" spc="-1" dirty="0" err="1">
+                <a:solidFill>
+                  <a:srgbClr val="000000"/>
+                </a:solidFill>
+                <a:uFill>
+                  <a:solidFill>
+                    <a:srgbClr val="FFFFFF"/>
+                  </a:solidFill>
+                </a:uFill>
+              </a:rPr>
+              <a:t>https</a:t>
+            </a:r>
+            <a:r>
+              <a:rPr lang="ro-RO" sz="1600" i="1" spc="-1" dirty="0">
+                <a:solidFill>
+                  <a:srgbClr val="000000"/>
+                </a:solidFill>
+                <a:uFill>
+                  <a:solidFill>
+                    <a:srgbClr val="FFFFFF"/>
+                  </a:solidFill>
+                </a:uFill>
+              </a:rPr>
+              <a:t>://</a:t>
+            </a:r>
+            <a:r>
+              <a:rPr lang="ro-RO" sz="1600" spc="-1" dirty="0">
+                <a:solidFill>
+                  <a:srgbClr val="000000"/>
+                </a:solidFill>
+                <a:uFill>
+                  <a:solidFill>
+                    <a:srgbClr val="FFFFFF"/>
+                  </a:solidFill>
+                </a:uFill>
+              </a:rPr>
+              <a:t>): Rulare</a:t>
+            </a:r>
+            <a:r>
+              <a:rPr lang="ro-RO" sz="1600" b="1" spc="-1" dirty="0">
+                <a:solidFill>
+                  <a:srgbClr val="000000"/>
+                </a:solidFill>
+                <a:uFill>
+                  <a:solidFill>
+                    <a:srgbClr val="FFFFFF"/>
+                  </a:solidFill>
+                </a:uFill>
+              </a:rPr>
+              <a:t> ./</a:t>
+            </a:r>
+            <a:r>
+              <a:rPr lang="ro-RO" sz="1600" b="1" spc="-1" dirty="0" err="1">
+                <a:solidFill>
+                  <a:srgbClr val="000000"/>
+                </a:solidFill>
+                <a:uFill>
+                  <a:solidFill>
+                    <a:srgbClr val="FFFFFF"/>
+                  </a:solidFill>
+                </a:uFill>
+              </a:rPr>
+              <a:t>lget</a:t>
+            </a:r>
+            <a:r>
+              <a:rPr lang="ro-RO" sz="1600" b="1" spc="-1" dirty="0">
+                <a:solidFill>
+                  <a:srgbClr val="000000"/>
+                </a:solidFill>
+                <a:uFill>
+                  <a:solidFill>
+                    <a:srgbClr val="FFFFFF"/>
+                  </a:solidFill>
+                </a:uFill>
+              </a:rPr>
+              <a:t> </a:t>
+            </a:r>
+            <a:r>
+              <a:rPr lang="ro-RO" sz="1600" b="1" spc="-1" dirty="0" err="1">
+                <a:solidFill>
+                  <a:srgbClr val="0432FF"/>
+                </a:solidFill>
+                <a:uFill>
+                  <a:solidFill>
+                    <a:srgbClr val="FFFFFF"/>
+                  </a:solidFill>
+                </a:uFill>
+              </a:rPr>
+              <a:t>httpforever.com</a:t>
+            </a:r>
+            <a:endParaRPr lang="ro-RO" sz="1600" b="1" spc="-1" dirty="0">
+              <a:solidFill>
+                <a:srgbClr val="0432FF"/>
+              </a:solidFill>
+              <a:uFill>
+                <a:solidFill>
+                  <a:srgbClr val="FFFFFF"/>
+                </a:solidFill>
+              </a:uFill>
+            </a:endParaRPr>
+          </a:p>
+          <a:p>
+            <a:pPr marL="1143000" lvl="2" indent="-226440">
+              <a:lnSpc>
+                <a:spcPct val="90000"/>
+              </a:lnSpc>
+              <a:buClr>
+                <a:srgbClr val="000000"/>
+              </a:buClr>
+              <a:buFont typeface="Arial"/>
+              <a:buChar char="•"/>
+            </a:pPr>
+            <a:r>
+              <a:rPr lang="ro-RO" sz="1600" i="1" spc="-1" dirty="0">
+                <a:solidFill>
+                  <a:srgbClr val="000000"/>
+                </a:solidFill>
+                <a:uFill>
+                  <a:solidFill>
+                    <a:srgbClr val="FFFFFF"/>
+                  </a:solidFill>
+                </a:uFill>
+              </a:rPr>
+              <a:t>Rezultat:</a:t>
+            </a:r>
+            <a:r>
+              <a:rPr lang="ro-RO" sz="1600" b="1" i="1" spc="-1" dirty="0">
+                <a:solidFill>
+                  <a:srgbClr val="000000"/>
+                </a:solidFill>
+                <a:uFill>
+                  <a:solidFill>
+                    <a:srgbClr val="FFFFFF"/>
+                  </a:solidFill>
+                </a:uFill>
+              </a:rPr>
+              <a:t> </a:t>
+            </a:r>
+            <a:r>
+              <a:rPr lang="ro-RO" sz="1600" spc="-1" dirty="0">
+                <a:solidFill>
+                  <a:srgbClr val="000000"/>
+                </a:solidFill>
+                <a:uFill>
+                  <a:solidFill>
+                    <a:srgbClr val="FFFFFF"/>
+                  </a:solidFill>
+                </a:uFill>
+              </a:rPr>
+              <a:t>Scriptul eșuează.</a:t>
+            </a:r>
+          </a:p>
+          <a:p>
+            <a:pPr marL="685800" lvl="1" indent="-226440">
+              <a:lnSpc>
+                <a:spcPct val="90000"/>
+              </a:lnSpc>
+              <a:buClr>
+                <a:srgbClr val="000000"/>
+              </a:buClr>
+              <a:buFont typeface="Arial"/>
+              <a:buChar char="•"/>
+            </a:pPr>
+            <a:endParaRPr lang="ro-RO" sz="1600" spc="-1" dirty="0">
+              <a:solidFill>
+                <a:srgbClr val="000000"/>
+              </a:solidFill>
+              <a:uFill>
+                <a:solidFill>
+                  <a:srgbClr val="FFFFFF"/>
+                </a:solidFill>
+              </a:uFill>
+            </a:endParaRPr>
+          </a:p>
+          <a:p>
+            <a:pPr marL="228600" indent="-226440">
+              <a:lnSpc>
+                <a:spcPct val="90000"/>
+              </a:lnSpc>
+              <a:buClr>
+                <a:srgbClr val="000000"/>
+              </a:buClr>
+              <a:buFont typeface="Arial"/>
+              <a:buChar char="•"/>
+            </a:pPr>
+            <a:endParaRPr lang="ro-RO" sz="2000" spc="-1" dirty="0">
+              <a:solidFill>
+                <a:srgbClr val="000000"/>
+              </a:solidFill>
+              <a:uFill>
+                <a:solidFill>
+                  <a:srgbClr val="FFFFFF"/>
+                </a:solidFill>
+              </a:uFill>
+            </a:endParaRPr>
+          </a:p>
+          <a:p>
+            <a:pPr marL="459360" lvl="1">
+              <a:lnSpc>
+                <a:spcPct val="90000"/>
+              </a:lnSpc>
+              <a:buClr>
+                <a:srgbClr val="000000"/>
+              </a:buClr>
+            </a:pPr>
+            <a:endParaRPr lang="ro-RO" sz="1600" spc="-1" dirty="0">
+              <a:solidFill>
+                <a:srgbClr val="000000"/>
+              </a:solidFill>
+              <a:uFill>
+                <a:solidFill>
+                  <a:srgbClr val="FFFFFF"/>
+                </a:solidFill>
+              </a:uFill>
+              <a:latin typeface="Arial"/>
+            </a:endParaRPr>
+          </a:p>
+          <a:p>
+            <a:pPr marL="459360" lvl="1">
+              <a:lnSpc>
+                <a:spcPct val="90000"/>
+              </a:lnSpc>
+              <a:buClr>
+                <a:srgbClr val="000000"/>
+              </a:buClr>
+            </a:pPr>
+            <a:endParaRPr lang="ro-RO" sz="1600" spc="-1" dirty="0">
               <a:solidFill>
                 <a:srgbClr val="000000"/>
               </a:solidFill>
@@ -9211,7 +10439,7 @@
               <a:buChar char="•"/>
             </a:pPr>
             <a:r>
-              <a:rPr lang="ro-RO" sz="2000" b="0" strike="noStrike" spc="-1" dirty="0" smtClean="0">
+              <a:rPr lang="ro-RO" sz="2000" b="0" strike="noStrike" spc="-1" dirty="0">
                 <a:solidFill>
                   <a:srgbClr val="000000"/>
                 </a:solidFill>
@@ -9236,7 +10464,7 @@
               <a:buFont typeface="Arial"/>
               <a:buChar char="•"/>
             </a:pPr>
-            <a:endParaRPr lang="ro-RO" sz="2000" b="0" strike="noStrike" spc="-1" dirty="0" smtClean="0">
+            <a:endParaRPr lang="ro-RO" sz="2000" b="0" strike="noStrike" spc="-1" dirty="0">
               <a:solidFill>
                 <a:srgbClr val="000000"/>
               </a:solidFill>
@@ -9260,7 +10488,7 @@
               <a:buChar char="•"/>
             </a:pPr>
             <a:r>
-              <a:rPr lang="ro-RO" sz="2000" spc="-1" dirty="0" smtClean="0">
+              <a:rPr lang="ro-RO" sz="2000" spc="-1" dirty="0">
                 <a:solidFill>
                   <a:srgbClr val="000000"/>
                 </a:solidFill>

</xml_diff>